<commit_message>
Edits to the ppt
</commit_message>
<xml_diff>
--- a/RecoverdDFTppt.pptx
+++ b/RecoverdDFTppt.pptx
@@ -5,16 +5,18 @@
     <p:sldMasterId id="2147483648" r:id="rId1"/>
   </p:sldMasterIdLst>
   <p:notesMasterIdLst>
-    <p:notesMasterId r:id="rId9"/>
+    <p:notesMasterId r:id="rId11"/>
   </p:notesMasterIdLst>
   <p:sldIdLst>
     <p:sldId id="256" r:id="rId2"/>
     <p:sldId id="257" r:id="rId3"/>
-    <p:sldId id="258" r:id="rId4"/>
-    <p:sldId id="259" r:id="rId5"/>
-    <p:sldId id="261" r:id="rId6"/>
-    <p:sldId id="262" r:id="rId7"/>
-    <p:sldId id="260" r:id="rId8"/>
+    <p:sldId id="263" r:id="rId4"/>
+    <p:sldId id="264" r:id="rId5"/>
+    <p:sldId id="258" r:id="rId6"/>
+    <p:sldId id="259" r:id="rId7"/>
+    <p:sldId id="261" r:id="rId8"/>
+    <p:sldId id="262" r:id="rId9"/>
+    <p:sldId id="260" r:id="rId10"/>
   </p:sldIdLst>
   <p:sldSz cx="12192000" cy="6858000"/>
   <p:notesSz cx="6858000" cy="9144000"/>
@@ -215,7 +217,7 @@
           <a:p>
             <a:fld id="{96F2C86F-4A2D-4626-A0AA-6F1FB8EFB446}" type="datetimeFigureOut">
               <a:rPr lang="en-US" smtClean="0"/>
-              <a:t>8/25/2020</a:t>
+              <a:t>8/28/2020</a:t>
             </a:fld>
             <a:endParaRPr lang="en-US"/>
           </a:p>
@@ -643,7 +645,7 @@
           <a:p>
             <a:fld id="{9601AF2B-5FCD-47A0-825D-A4952FFF1367}" type="slidenum">
               <a:rPr lang="en-US" smtClean="0"/>
-              <a:t>6</a:t>
+              <a:t>8</a:t>
             </a:fld>
             <a:endParaRPr lang="en-US"/>
           </a:p>
@@ -809,7 +811,7 @@
           <a:p>
             <a:fld id="{A68A2230-04CB-441E-9157-E70EC1ED1AFA}" type="datetimeFigureOut">
               <a:rPr lang="en-US" smtClean="0"/>
-              <a:t>8/25/2020</a:t>
+              <a:t>8/28/2020</a:t>
             </a:fld>
             <a:endParaRPr lang="en-US"/>
           </a:p>
@@ -1007,7 +1009,7 @@
           <a:p>
             <a:fld id="{A68A2230-04CB-441E-9157-E70EC1ED1AFA}" type="datetimeFigureOut">
               <a:rPr lang="en-US" smtClean="0"/>
-              <a:t>8/25/2020</a:t>
+              <a:t>8/28/2020</a:t>
             </a:fld>
             <a:endParaRPr lang="en-US"/>
           </a:p>
@@ -1215,7 +1217,7 @@
           <a:p>
             <a:fld id="{A68A2230-04CB-441E-9157-E70EC1ED1AFA}" type="datetimeFigureOut">
               <a:rPr lang="en-US" smtClean="0"/>
-              <a:t>8/25/2020</a:t>
+              <a:t>8/28/2020</a:t>
             </a:fld>
             <a:endParaRPr lang="en-US"/>
           </a:p>
@@ -1413,7 +1415,7 @@
           <a:p>
             <a:fld id="{A68A2230-04CB-441E-9157-E70EC1ED1AFA}" type="datetimeFigureOut">
               <a:rPr lang="en-US" smtClean="0"/>
-              <a:t>8/25/2020</a:t>
+              <a:t>8/28/2020</a:t>
             </a:fld>
             <a:endParaRPr lang="en-US"/>
           </a:p>
@@ -1688,7 +1690,7 @@
           <a:p>
             <a:fld id="{A68A2230-04CB-441E-9157-E70EC1ED1AFA}" type="datetimeFigureOut">
               <a:rPr lang="en-US" smtClean="0"/>
-              <a:t>8/25/2020</a:t>
+              <a:t>8/28/2020</a:t>
             </a:fld>
             <a:endParaRPr lang="en-US"/>
           </a:p>
@@ -1953,7 +1955,7 @@
           <a:p>
             <a:fld id="{A68A2230-04CB-441E-9157-E70EC1ED1AFA}" type="datetimeFigureOut">
               <a:rPr lang="en-US" smtClean="0"/>
-              <a:t>8/25/2020</a:t>
+              <a:t>8/28/2020</a:t>
             </a:fld>
             <a:endParaRPr lang="en-US"/>
           </a:p>
@@ -2365,7 +2367,7 @@
           <a:p>
             <a:fld id="{A68A2230-04CB-441E-9157-E70EC1ED1AFA}" type="datetimeFigureOut">
               <a:rPr lang="en-US" smtClean="0"/>
-              <a:t>8/25/2020</a:t>
+              <a:t>8/28/2020</a:t>
             </a:fld>
             <a:endParaRPr lang="en-US"/>
           </a:p>
@@ -2506,7 +2508,7 @@
           <a:p>
             <a:fld id="{A68A2230-04CB-441E-9157-E70EC1ED1AFA}" type="datetimeFigureOut">
               <a:rPr lang="en-US" smtClean="0"/>
-              <a:t>8/25/2020</a:t>
+              <a:t>8/28/2020</a:t>
             </a:fld>
             <a:endParaRPr lang="en-US"/>
           </a:p>
@@ -2619,7 +2621,7 @@
           <a:p>
             <a:fld id="{A68A2230-04CB-441E-9157-E70EC1ED1AFA}" type="datetimeFigureOut">
               <a:rPr lang="en-US" smtClean="0"/>
-              <a:t>8/25/2020</a:t>
+              <a:t>8/28/2020</a:t>
             </a:fld>
             <a:endParaRPr lang="en-US"/>
           </a:p>
@@ -2930,7 +2932,7 @@
           <a:p>
             <a:fld id="{A68A2230-04CB-441E-9157-E70EC1ED1AFA}" type="datetimeFigureOut">
               <a:rPr lang="en-US" smtClean="0"/>
-              <a:t>8/25/2020</a:t>
+              <a:t>8/28/2020</a:t>
             </a:fld>
             <a:endParaRPr lang="en-US"/>
           </a:p>
@@ -3218,7 +3220,7 @@
           <a:p>
             <a:fld id="{A68A2230-04CB-441E-9157-E70EC1ED1AFA}" type="datetimeFigureOut">
               <a:rPr lang="en-US" smtClean="0"/>
-              <a:t>8/25/2020</a:t>
+              <a:t>8/28/2020</a:t>
             </a:fld>
             <a:endParaRPr lang="en-US"/>
           </a:p>
@@ -3459,7 +3461,7 @@
           <a:p>
             <a:fld id="{A68A2230-04CB-441E-9157-E70EC1ED1AFA}" type="datetimeFigureOut">
               <a:rPr lang="en-US" smtClean="0"/>
-              <a:t>8/25/2020</a:t>
+              <a:t>8/28/2020</a:t>
             </a:fld>
             <a:endParaRPr lang="en-US"/>
           </a:p>
@@ -4067,6 +4069,301 @@
           <p:cNvPr id="2" name="Title 1">
             <a:extLst>
               <a:ext uri="{FF2B5EF4-FFF2-40B4-BE49-F238E27FC236}">
+                <a16:creationId xmlns:a16="http://schemas.microsoft.com/office/drawing/2014/main" id="{46F4043B-3880-4E51-A104-492328CE5E0A}"/>
+              </a:ext>
+            </a:extLst>
+          </p:cNvPr>
+          <p:cNvSpPr>
+            <a:spLocks noGrp="1"/>
+          </p:cNvSpPr>
+          <p:nvPr>
+            <p:ph type="title"/>
+          </p:nvPr>
+        </p:nvSpPr>
+        <p:spPr/>
+        <p:txBody>
+          <a:bodyPr/>
+          <a:lstStyle/>
+          <a:p>
+            <a:r>
+              <a:rPr lang="en-US" dirty="0"/>
+              <a:t>Overview</a:t>
+            </a:r>
+          </a:p>
+        </p:txBody>
+      </p:sp>
+      <p:sp>
+        <p:nvSpPr>
+          <p:cNvPr id="3" name="Content Placeholder 2">
+            <a:extLst>
+              <a:ext uri="{FF2B5EF4-FFF2-40B4-BE49-F238E27FC236}">
+                <a16:creationId xmlns:a16="http://schemas.microsoft.com/office/drawing/2014/main" id="{86068946-1436-49DF-99C4-3099F7F18D30}"/>
+              </a:ext>
+            </a:extLst>
+          </p:cNvPr>
+          <p:cNvSpPr>
+            <a:spLocks noGrp="1"/>
+          </p:cNvSpPr>
+          <p:nvPr>
+            <p:ph idx="1"/>
+          </p:nvPr>
+        </p:nvSpPr>
+        <p:spPr/>
+        <p:txBody>
+          <a:bodyPr/>
+          <a:lstStyle/>
+          <a:p>
+            <a:pPr algn="l">
+              <a:buFont typeface="Arial" panose="020B0604020202020204" pitchFamily="34" charset="0"/>
+              <a:buChar char="•"/>
+            </a:pPr>
+            <a:r>
+              <a:rPr lang="en-US" b="0" i="0" dirty="0">
+                <a:solidFill>
+                  <a:srgbClr val="333333"/>
+                </a:solidFill>
+                <a:effectLst/>
+                <a:latin typeface="Montserrat"/>
+              </a:rPr>
+              <a:t>Title Slide</a:t>
+            </a:r>
+          </a:p>
+          <a:p>
+            <a:pPr algn="l">
+              <a:buFont typeface="Arial" panose="020B0604020202020204" pitchFamily="34" charset="0"/>
+              <a:buChar char="•"/>
+            </a:pPr>
+            <a:r>
+              <a:rPr lang="en-US" b="0" i="0" dirty="0">
+                <a:solidFill>
+                  <a:srgbClr val="333333"/>
+                </a:solidFill>
+                <a:effectLst/>
+                <a:latin typeface="Montserrat"/>
+              </a:rPr>
+              <a:t>Your Background</a:t>
+            </a:r>
+          </a:p>
+          <a:p>
+            <a:pPr algn="l">
+              <a:buFont typeface="Arial" panose="020B0604020202020204" pitchFamily="34" charset="0"/>
+              <a:buChar char="•"/>
+            </a:pPr>
+            <a:r>
+              <a:rPr lang="en-US" b="0" i="0" dirty="0">
+                <a:solidFill>
+                  <a:srgbClr val="333333"/>
+                </a:solidFill>
+                <a:effectLst/>
+                <a:latin typeface="Montserrat"/>
+              </a:rPr>
+              <a:t>Project Introduction / Background</a:t>
+            </a:r>
+          </a:p>
+          <a:p>
+            <a:pPr algn="l">
+              <a:buFont typeface="Arial" panose="020B0604020202020204" pitchFamily="34" charset="0"/>
+              <a:buChar char="•"/>
+            </a:pPr>
+            <a:r>
+              <a:rPr lang="en-US" b="0" i="0" dirty="0">
+                <a:solidFill>
+                  <a:srgbClr val="333333"/>
+                </a:solidFill>
+                <a:effectLst/>
+                <a:latin typeface="Montserrat"/>
+              </a:rPr>
+              <a:t>Methods</a:t>
+            </a:r>
+          </a:p>
+          <a:p>
+            <a:pPr algn="l">
+              <a:buFont typeface="Arial" panose="020B0604020202020204" pitchFamily="34" charset="0"/>
+              <a:buChar char="•"/>
+            </a:pPr>
+            <a:r>
+              <a:rPr lang="en-US" b="0" i="0" dirty="0">
+                <a:solidFill>
+                  <a:srgbClr val="333333"/>
+                </a:solidFill>
+                <a:effectLst/>
+                <a:latin typeface="Montserrat"/>
+              </a:rPr>
+              <a:t>Results</a:t>
+            </a:r>
+          </a:p>
+          <a:p>
+            <a:pPr algn="l">
+              <a:buFont typeface="Arial" panose="020B0604020202020204" pitchFamily="34" charset="0"/>
+              <a:buChar char="•"/>
+            </a:pPr>
+            <a:r>
+              <a:rPr lang="en-US" b="0" i="0" dirty="0">
+                <a:solidFill>
+                  <a:srgbClr val="333333"/>
+                </a:solidFill>
+                <a:effectLst/>
+                <a:latin typeface="Montserrat"/>
+              </a:rPr>
+              <a:t>Summary</a:t>
+            </a:r>
+          </a:p>
+          <a:p>
+            <a:pPr algn="l">
+              <a:buFont typeface="Arial" panose="020B0604020202020204" pitchFamily="34" charset="0"/>
+              <a:buChar char="•"/>
+            </a:pPr>
+            <a:r>
+              <a:rPr lang="en-US" b="0" i="0" dirty="0">
+                <a:solidFill>
+                  <a:srgbClr val="333333"/>
+                </a:solidFill>
+                <a:effectLst/>
+                <a:latin typeface="Montserrat"/>
+              </a:rPr>
+              <a:t>Conclusions</a:t>
+            </a:r>
+          </a:p>
+          <a:p>
+            <a:pPr algn="l">
+              <a:buFont typeface="Arial" panose="020B0604020202020204" pitchFamily="34" charset="0"/>
+              <a:buChar char="•"/>
+            </a:pPr>
+            <a:r>
+              <a:rPr lang="en-US" b="0" i="0" dirty="0">
+                <a:solidFill>
+                  <a:srgbClr val="333333"/>
+                </a:solidFill>
+                <a:effectLst/>
+                <a:latin typeface="Montserrat"/>
+              </a:rPr>
+              <a:t>Questions</a:t>
+            </a:r>
+          </a:p>
+          <a:p>
+            <a:endParaRPr lang="en-US" dirty="0"/>
+          </a:p>
+        </p:txBody>
+      </p:sp>
+    </p:spTree>
+    <p:extLst>
+      <p:ext uri="{BB962C8B-B14F-4D97-AF65-F5344CB8AC3E}">
+        <p14:creationId xmlns:p14="http://schemas.microsoft.com/office/powerpoint/2010/main" val="1115756292"/>
+      </p:ext>
+    </p:extLst>
+  </p:cSld>
+  <p:clrMapOvr>
+    <a:masterClrMapping/>
+  </p:clrMapOvr>
+</p:sld>
+</file>
+
+<file path=ppt/slides/slide4.xml><?xml version="1.0" encoding="utf-8"?>
+<p:sld xmlns:a="http://schemas.openxmlformats.org/drawingml/2006/main" xmlns:r="http://schemas.openxmlformats.org/officeDocument/2006/relationships" xmlns:p="http://schemas.openxmlformats.org/presentationml/2006/main">
+  <p:cSld>
+    <p:spTree>
+      <p:nvGrpSpPr>
+        <p:cNvPr id="1" name=""/>
+        <p:cNvGrpSpPr/>
+        <p:nvPr/>
+      </p:nvGrpSpPr>
+      <p:grpSpPr>
+        <a:xfrm>
+          <a:off x="0" y="0"/>
+          <a:ext cx="0" cy="0"/>
+          <a:chOff x="0" y="0"/>
+          <a:chExt cx="0" cy="0"/>
+        </a:xfrm>
+      </p:grpSpPr>
+      <p:sp>
+        <p:nvSpPr>
+          <p:cNvPr id="2" name="Title 1">
+            <a:extLst>
+              <a:ext uri="{FF2B5EF4-FFF2-40B4-BE49-F238E27FC236}">
+                <a16:creationId xmlns:a16="http://schemas.microsoft.com/office/drawing/2014/main" id="{8ACC9718-8B84-4DBA-AB23-D7555D1F77AE}"/>
+              </a:ext>
+            </a:extLst>
+          </p:cNvPr>
+          <p:cNvSpPr>
+            <a:spLocks noGrp="1"/>
+          </p:cNvSpPr>
+          <p:nvPr>
+            <p:ph type="title"/>
+          </p:nvPr>
+        </p:nvSpPr>
+        <p:spPr/>
+        <p:txBody>
+          <a:bodyPr/>
+          <a:lstStyle/>
+          <a:p>
+            <a:r>
+              <a:rPr lang="en-US"/>
+              <a:t>Background</a:t>
+            </a:r>
+            <a:endParaRPr lang="en-US" dirty="0"/>
+          </a:p>
+        </p:txBody>
+      </p:sp>
+      <p:sp>
+        <p:nvSpPr>
+          <p:cNvPr id="3" name="Content Placeholder 2">
+            <a:extLst>
+              <a:ext uri="{FF2B5EF4-FFF2-40B4-BE49-F238E27FC236}">
+                <a16:creationId xmlns:a16="http://schemas.microsoft.com/office/drawing/2014/main" id="{39A47145-3EC6-42DB-BBD7-9FCEE02FF15F}"/>
+              </a:ext>
+            </a:extLst>
+          </p:cNvPr>
+          <p:cNvSpPr>
+            <a:spLocks noGrp="1"/>
+          </p:cNvSpPr>
+          <p:nvPr>
+            <p:ph idx="1"/>
+          </p:nvPr>
+        </p:nvSpPr>
+        <p:spPr/>
+        <p:txBody>
+          <a:bodyPr/>
+          <a:lstStyle/>
+          <a:p>
+            <a:endParaRPr lang="en-US"/>
+          </a:p>
+        </p:txBody>
+      </p:sp>
+    </p:spTree>
+    <p:extLst>
+      <p:ext uri="{BB962C8B-B14F-4D97-AF65-F5344CB8AC3E}">
+        <p14:creationId xmlns:p14="http://schemas.microsoft.com/office/powerpoint/2010/main" val="2342924608"/>
+      </p:ext>
+    </p:extLst>
+  </p:cSld>
+  <p:clrMapOvr>
+    <a:masterClrMapping/>
+  </p:clrMapOvr>
+</p:sld>
+</file>
+
+<file path=ppt/slides/slide5.xml><?xml version="1.0" encoding="utf-8"?>
+<p:sld xmlns:a="http://schemas.openxmlformats.org/drawingml/2006/main" xmlns:r="http://schemas.openxmlformats.org/officeDocument/2006/relationships" xmlns:p="http://schemas.openxmlformats.org/presentationml/2006/main">
+  <p:cSld>
+    <p:spTree>
+      <p:nvGrpSpPr>
+        <p:cNvPr id="1" name=""/>
+        <p:cNvGrpSpPr/>
+        <p:nvPr/>
+      </p:nvGrpSpPr>
+      <p:grpSpPr>
+        <a:xfrm>
+          <a:off x="0" y="0"/>
+          <a:ext cx="0" cy="0"/>
+          <a:chOff x="0" y="0"/>
+          <a:chExt cx="0" cy="0"/>
+        </a:xfrm>
+      </p:grpSpPr>
+      <p:sp>
+        <p:nvSpPr>
+          <p:cNvPr id="2" name="Title 1">
+            <a:extLst>
+              <a:ext uri="{FF2B5EF4-FFF2-40B4-BE49-F238E27FC236}">
                 <a16:creationId xmlns:a16="http://schemas.microsoft.com/office/drawing/2014/main" id="{34EB9AAA-5BEB-4CE6-AFB1-6C785AB4BE46}"/>
               </a:ext>
             </a:extLst>
@@ -4311,7 +4608,7 @@
 </p:sld>
 </file>
 
-<file path=ppt/slides/slide4.xml><?xml version="1.0" encoding="utf-8"?>
+<file path=ppt/slides/slide6.xml><?xml version="1.0" encoding="utf-8"?>
 <p:sld xmlns:a="http://schemas.openxmlformats.org/drawingml/2006/main" xmlns:r="http://schemas.openxmlformats.org/officeDocument/2006/relationships" xmlns:p="http://schemas.openxmlformats.org/presentationml/2006/main">
   <p:cSld>
     <p:spTree>
@@ -4552,7 +4849,7 @@
 </p:sld>
 </file>
 
-<file path=ppt/slides/slide5.xml><?xml version="1.0" encoding="utf-8"?>
+<file path=ppt/slides/slide7.xml><?xml version="1.0" encoding="utf-8"?>
 <p:sld xmlns:a="http://schemas.openxmlformats.org/drawingml/2006/main" xmlns:r="http://schemas.openxmlformats.org/officeDocument/2006/relationships" xmlns:p="http://schemas.openxmlformats.org/presentationml/2006/main">
   <p:cSld>
     <p:spTree>
@@ -4780,7 +5077,7 @@
 </p:sld>
 </file>
 
-<file path=ppt/slides/slide6.xml><?xml version="1.0" encoding="utf-8"?>
+<file path=ppt/slides/slide8.xml><?xml version="1.0" encoding="utf-8"?>
 <p:sld xmlns:a="http://schemas.openxmlformats.org/drawingml/2006/main" xmlns:r="http://schemas.openxmlformats.org/officeDocument/2006/relationships" xmlns:p="http://schemas.openxmlformats.org/presentationml/2006/main">
   <p:cSld>
     <p:spTree>
@@ -4879,7 +5176,7 @@
 </p:sld>
 </file>
 
-<file path=ppt/slides/slide7.xml><?xml version="1.0" encoding="utf-8"?>
+<file path=ppt/slides/slide9.xml><?xml version="1.0" encoding="utf-8"?>
 <p:sld xmlns:a="http://schemas.openxmlformats.org/drawingml/2006/main" xmlns:r="http://schemas.openxmlformats.org/officeDocument/2006/relationships" xmlns:p="http://schemas.openxmlformats.org/presentationml/2006/main">
   <p:cSld>
     <p:spTree>

</xml_diff>

<commit_message>
Adding my questions to ppt
</commit_message>
<xml_diff>
--- a/RecoverdDFTppt.pptx
+++ b/RecoverdDFTppt.pptx
@@ -5,7 +5,7 @@
     <p:sldMasterId id="2147483648" r:id="rId1"/>
   </p:sldMasterIdLst>
   <p:notesMasterIdLst>
-    <p:notesMasterId r:id="rId11"/>
+    <p:notesMasterId r:id="rId14"/>
   </p:notesMasterIdLst>
   <p:sldIdLst>
     <p:sldId id="256" r:id="rId2"/>
@@ -16,7 +16,10 @@
     <p:sldId id="259" r:id="rId7"/>
     <p:sldId id="261" r:id="rId8"/>
     <p:sldId id="262" r:id="rId9"/>
-    <p:sldId id="260" r:id="rId10"/>
+    <p:sldId id="265" r:id="rId10"/>
+    <p:sldId id="267" r:id="rId11"/>
+    <p:sldId id="266" r:id="rId12"/>
+    <p:sldId id="260" r:id="rId13"/>
   </p:sldIdLst>
   <p:sldSz cx="12192000" cy="6858000"/>
   <p:notesSz cx="6858000" cy="9144000"/>
@@ -217,7 +220,7 @@
           <a:p>
             <a:fld id="{96F2C86F-4A2D-4626-A0AA-6F1FB8EFB446}" type="datetimeFigureOut">
               <a:rPr lang="en-US" smtClean="0"/>
-              <a:t>8/28/2020</a:t>
+              <a:t>8/29/2020</a:t>
             </a:fld>
             <a:endParaRPr lang="en-US"/>
           </a:p>
@@ -811,7 +814,7 @@
           <a:p>
             <a:fld id="{A68A2230-04CB-441E-9157-E70EC1ED1AFA}" type="datetimeFigureOut">
               <a:rPr lang="en-US" smtClean="0"/>
-              <a:t>8/28/2020</a:t>
+              <a:t>8/29/2020</a:t>
             </a:fld>
             <a:endParaRPr lang="en-US"/>
           </a:p>
@@ -1009,7 +1012,7 @@
           <a:p>
             <a:fld id="{A68A2230-04CB-441E-9157-E70EC1ED1AFA}" type="datetimeFigureOut">
               <a:rPr lang="en-US" smtClean="0"/>
-              <a:t>8/28/2020</a:t>
+              <a:t>8/29/2020</a:t>
             </a:fld>
             <a:endParaRPr lang="en-US"/>
           </a:p>
@@ -1217,7 +1220,7 @@
           <a:p>
             <a:fld id="{A68A2230-04CB-441E-9157-E70EC1ED1AFA}" type="datetimeFigureOut">
               <a:rPr lang="en-US" smtClean="0"/>
-              <a:t>8/28/2020</a:t>
+              <a:t>8/29/2020</a:t>
             </a:fld>
             <a:endParaRPr lang="en-US"/>
           </a:p>
@@ -1415,7 +1418,7 @@
           <a:p>
             <a:fld id="{A68A2230-04CB-441E-9157-E70EC1ED1AFA}" type="datetimeFigureOut">
               <a:rPr lang="en-US" smtClean="0"/>
-              <a:t>8/28/2020</a:t>
+              <a:t>8/29/2020</a:t>
             </a:fld>
             <a:endParaRPr lang="en-US"/>
           </a:p>
@@ -1690,7 +1693,7 @@
           <a:p>
             <a:fld id="{A68A2230-04CB-441E-9157-E70EC1ED1AFA}" type="datetimeFigureOut">
               <a:rPr lang="en-US" smtClean="0"/>
-              <a:t>8/28/2020</a:t>
+              <a:t>8/29/2020</a:t>
             </a:fld>
             <a:endParaRPr lang="en-US"/>
           </a:p>
@@ -1955,7 +1958,7 @@
           <a:p>
             <a:fld id="{A68A2230-04CB-441E-9157-E70EC1ED1AFA}" type="datetimeFigureOut">
               <a:rPr lang="en-US" smtClean="0"/>
-              <a:t>8/28/2020</a:t>
+              <a:t>8/29/2020</a:t>
             </a:fld>
             <a:endParaRPr lang="en-US"/>
           </a:p>
@@ -2367,7 +2370,7 @@
           <a:p>
             <a:fld id="{A68A2230-04CB-441E-9157-E70EC1ED1AFA}" type="datetimeFigureOut">
               <a:rPr lang="en-US" smtClean="0"/>
-              <a:t>8/28/2020</a:t>
+              <a:t>8/29/2020</a:t>
             </a:fld>
             <a:endParaRPr lang="en-US"/>
           </a:p>
@@ -2508,7 +2511,7 @@
           <a:p>
             <a:fld id="{A68A2230-04CB-441E-9157-E70EC1ED1AFA}" type="datetimeFigureOut">
               <a:rPr lang="en-US" smtClean="0"/>
-              <a:t>8/28/2020</a:t>
+              <a:t>8/29/2020</a:t>
             </a:fld>
             <a:endParaRPr lang="en-US"/>
           </a:p>
@@ -2621,7 +2624,7 @@
           <a:p>
             <a:fld id="{A68A2230-04CB-441E-9157-E70EC1ED1AFA}" type="datetimeFigureOut">
               <a:rPr lang="en-US" smtClean="0"/>
-              <a:t>8/28/2020</a:t>
+              <a:t>8/29/2020</a:t>
             </a:fld>
             <a:endParaRPr lang="en-US"/>
           </a:p>
@@ -2932,7 +2935,7 @@
           <a:p>
             <a:fld id="{A68A2230-04CB-441E-9157-E70EC1ED1AFA}" type="datetimeFigureOut">
               <a:rPr lang="en-US" smtClean="0"/>
-              <a:t>8/28/2020</a:t>
+              <a:t>8/29/2020</a:t>
             </a:fld>
             <a:endParaRPr lang="en-US"/>
           </a:p>
@@ -3220,7 +3223,7 @@
           <a:p>
             <a:fld id="{A68A2230-04CB-441E-9157-E70EC1ED1AFA}" type="datetimeFigureOut">
               <a:rPr lang="en-US" smtClean="0"/>
-              <a:t>8/28/2020</a:t>
+              <a:t>8/29/2020</a:t>
             </a:fld>
             <a:endParaRPr lang="en-US"/>
           </a:p>
@@ -3461,7 +3464,7 @@
           <a:p>
             <a:fld id="{A68A2230-04CB-441E-9157-E70EC1ED1AFA}" type="datetimeFigureOut">
               <a:rPr lang="en-US" smtClean="0"/>
-              <a:t>8/28/2020</a:t>
+              <a:t>8/29/2020</a:t>
             </a:fld>
             <a:endParaRPr lang="en-US"/>
           </a:p>
@@ -3949,6 +3952,341 @@
 </p:sld>
 </file>
 
+<file path=ppt/slides/slide10.xml><?xml version="1.0" encoding="utf-8"?>
+<p:sld xmlns:a="http://schemas.openxmlformats.org/drawingml/2006/main" xmlns:r="http://schemas.openxmlformats.org/officeDocument/2006/relationships" xmlns:p="http://schemas.openxmlformats.org/presentationml/2006/main">
+  <p:cSld>
+    <p:spTree>
+      <p:nvGrpSpPr>
+        <p:cNvPr id="1" name=""/>
+        <p:cNvGrpSpPr/>
+        <p:nvPr/>
+      </p:nvGrpSpPr>
+      <p:grpSpPr>
+        <a:xfrm>
+          <a:off x="0" y="0"/>
+          <a:ext cx="0" cy="0"/>
+          <a:chOff x="0" y="0"/>
+          <a:chExt cx="0" cy="0"/>
+        </a:xfrm>
+      </p:grpSpPr>
+      <p:sp>
+        <p:nvSpPr>
+          <p:cNvPr id="2" name="Title 1">
+            <a:extLst>
+              <a:ext uri="{FF2B5EF4-FFF2-40B4-BE49-F238E27FC236}">
+                <a16:creationId xmlns:a16="http://schemas.microsoft.com/office/drawing/2014/main" id="{AE3B0C92-8C33-47A9-94A2-801A38F6B3E0}"/>
+              </a:ext>
+            </a:extLst>
+          </p:cNvPr>
+          <p:cNvSpPr>
+            <a:spLocks noGrp="1"/>
+          </p:cNvSpPr>
+          <p:nvPr>
+            <p:ph type="title"/>
+          </p:nvPr>
+        </p:nvSpPr>
+        <p:spPr>
+          <a:xfrm>
+            <a:off x="838200" y="365125"/>
+            <a:ext cx="10515600" cy="2035174"/>
+          </a:xfrm>
+        </p:spPr>
+        <p:txBody>
+          <a:bodyPr>
+            <a:normAutofit fontScale="90000"/>
+          </a:bodyPr>
+          <a:lstStyle/>
+          <a:p>
+            <a:r>
+              <a:rPr lang="en-US" dirty="0"/>
+              <a:t>QN: </a:t>
+            </a:r>
+            <a:r>
+              <a:rPr lang="en-US" b="1" i="0" dirty="0">
+                <a:solidFill>
+                  <a:srgbClr val="000000"/>
+                </a:solidFill>
+                <a:effectLst/>
+                <a:latin typeface="Helvetica Neue"/>
+              </a:rPr>
+              <a:t> </a:t>
+            </a:r>
+            <a:r>
+              <a:rPr lang="en-US" i="0" dirty="0">
+                <a:solidFill>
+                  <a:srgbClr val="000000"/>
+                </a:solidFill>
+                <a:effectLst/>
+              </a:rPr>
+              <a:t>Are the number of homeless cases affecting the general public. Are the homeless spreading COVID19 because they have no homes?</a:t>
+            </a:r>
+            <a:endParaRPr lang="en-US" dirty="0"/>
+          </a:p>
+        </p:txBody>
+      </p:sp>
+      <p:sp>
+        <p:nvSpPr>
+          <p:cNvPr id="3" name="Content Placeholder 2">
+            <a:extLst>
+              <a:ext uri="{FF2B5EF4-FFF2-40B4-BE49-F238E27FC236}">
+                <a16:creationId xmlns:a16="http://schemas.microsoft.com/office/drawing/2014/main" id="{9875D5FB-597C-43A6-B437-0B3C198EC566}"/>
+              </a:ext>
+            </a:extLst>
+          </p:cNvPr>
+          <p:cNvSpPr>
+            <a:spLocks noGrp="1"/>
+          </p:cNvSpPr>
+          <p:nvPr>
+            <p:ph idx="1"/>
+          </p:nvPr>
+        </p:nvSpPr>
+        <p:spPr>
+          <a:xfrm>
+            <a:off x="838200" y="2400299"/>
+            <a:ext cx="10515600" cy="3776663"/>
+          </a:xfrm>
+        </p:spPr>
+        <p:txBody>
+          <a:bodyPr/>
+          <a:lstStyle/>
+          <a:p>
+            <a:r>
+              <a:rPr lang="en-US" dirty="0"/>
+              <a:t>We ran linear regression predictive analysis.</a:t>
+            </a:r>
+          </a:p>
+          <a:p>
+            <a:pPr lvl="1"/>
+            <a:r>
+              <a:rPr lang="en-US" dirty="0"/>
+              <a:t>Linear regression will be used to explain the relationship between the homeless population and the general public population.</a:t>
+            </a:r>
+          </a:p>
+          <a:p>
+            <a:r>
+              <a:rPr lang="en-US" dirty="0"/>
+              <a:t>We discovered that the homeless population was responsible for 996% of the spread of COVID19 to the general public. The 4% can be explained by other factors. </a:t>
+            </a:r>
+          </a:p>
+          <a:p>
+            <a:r>
+              <a:rPr lang="en-US" dirty="0"/>
+              <a:t>How ever, we found a lot of variance, the data was not evenly distributed.</a:t>
+            </a:r>
+          </a:p>
+        </p:txBody>
+      </p:sp>
+    </p:spTree>
+    <p:extLst>
+      <p:ext uri="{BB962C8B-B14F-4D97-AF65-F5344CB8AC3E}">
+        <p14:creationId xmlns:p14="http://schemas.microsoft.com/office/powerpoint/2010/main" val="2763260367"/>
+      </p:ext>
+    </p:extLst>
+  </p:cSld>
+  <p:clrMapOvr>
+    <a:masterClrMapping/>
+  </p:clrMapOvr>
+</p:sld>
+</file>
+
+<file path=ppt/slides/slide11.xml><?xml version="1.0" encoding="utf-8"?>
+<p:sld xmlns:a="http://schemas.openxmlformats.org/drawingml/2006/main" xmlns:r="http://schemas.openxmlformats.org/officeDocument/2006/relationships" xmlns:p="http://schemas.openxmlformats.org/presentationml/2006/main">
+  <p:cSld>
+    <p:spTree>
+      <p:nvGrpSpPr>
+        <p:cNvPr id="1" name=""/>
+        <p:cNvGrpSpPr/>
+        <p:nvPr/>
+      </p:nvGrpSpPr>
+      <p:grpSpPr>
+        <a:xfrm>
+          <a:off x="0" y="0"/>
+          <a:ext cx="0" cy="0"/>
+          <a:chOff x="0" y="0"/>
+          <a:chExt cx="0" cy="0"/>
+        </a:xfrm>
+      </p:grpSpPr>
+      <p:sp>
+        <p:nvSpPr>
+          <p:cNvPr id="2" name="Title 1">
+            <a:extLst>
+              <a:ext uri="{FF2B5EF4-FFF2-40B4-BE49-F238E27FC236}">
+                <a16:creationId xmlns:a16="http://schemas.microsoft.com/office/drawing/2014/main" id="{AE3B0C92-8C33-47A9-94A2-801A38F6B3E0}"/>
+              </a:ext>
+            </a:extLst>
+          </p:cNvPr>
+          <p:cNvSpPr>
+            <a:spLocks noGrp="1"/>
+          </p:cNvSpPr>
+          <p:nvPr>
+            <p:ph type="title"/>
+          </p:nvPr>
+        </p:nvSpPr>
+        <p:spPr/>
+        <p:txBody>
+          <a:bodyPr/>
+          <a:lstStyle/>
+          <a:p>
+            <a:endParaRPr lang="en-US"/>
+          </a:p>
+        </p:txBody>
+      </p:sp>
+      <p:sp>
+        <p:nvSpPr>
+          <p:cNvPr id="3" name="Content Placeholder 2">
+            <a:extLst>
+              <a:ext uri="{FF2B5EF4-FFF2-40B4-BE49-F238E27FC236}">
+                <a16:creationId xmlns:a16="http://schemas.microsoft.com/office/drawing/2014/main" id="{9875D5FB-597C-43A6-B437-0B3C198EC566}"/>
+              </a:ext>
+            </a:extLst>
+          </p:cNvPr>
+          <p:cNvSpPr>
+            <a:spLocks noGrp="1"/>
+          </p:cNvSpPr>
+          <p:nvPr>
+            <p:ph idx="1"/>
+          </p:nvPr>
+        </p:nvSpPr>
+        <p:spPr/>
+        <p:txBody>
+          <a:bodyPr/>
+          <a:lstStyle/>
+          <a:p>
+            <a:endParaRPr lang="en-US"/>
+          </a:p>
+        </p:txBody>
+      </p:sp>
+    </p:spTree>
+    <p:extLst>
+      <p:ext uri="{BB962C8B-B14F-4D97-AF65-F5344CB8AC3E}">
+        <p14:creationId xmlns:p14="http://schemas.microsoft.com/office/powerpoint/2010/main" val="808064136"/>
+      </p:ext>
+    </p:extLst>
+  </p:cSld>
+  <p:clrMapOvr>
+    <a:masterClrMapping/>
+  </p:clrMapOvr>
+</p:sld>
+</file>
+
+<file path=ppt/slides/slide12.xml><?xml version="1.0" encoding="utf-8"?>
+<p:sld xmlns:a="http://schemas.openxmlformats.org/drawingml/2006/main" xmlns:r="http://schemas.openxmlformats.org/officeDocument/2006/relationships" xmlns:p="http://schemas.openxmlformats.org/presentationml/2006/main">
+  <p:cSld>
+    <p:spTree>
+      <p:nvGrpSpPr>
+        <p:cNvPr id="1" name=""/>
+        <p:cNvGrpSpPr/>
+        <p:nvPr/>
+      </p:nvGrpSpPr>
+      <p:grpSpPr>
+        <a:xfrm>
+          <a:off x="0" y="0"/>
+          <a:ext cx="0" cy="0"/>
+          <a:chOff x="0" y="0"/>
+          <a:chExt cx="0" cy="0"/>
+        </a:xfrm>
+      </p:grpSpPr>
+      <p:sp>
+        <p:nvSpPr>
+          <p:cNvPr id="2" name="Title 1">
+            <a:extLst>
+              <a:ext uri="{FF2B5EF4-FFF2-40B4-BE49-F238E27FC236}">
+                <a16:creationId xmlns:a16="http://schemas.microsoft.com/office/drawing/2014/main" id="{2385F15A-0D6A-4078-B7AC-40B46686C7DE}"/>
+              </a:ext>
+            </a:extLst>
+          </p:cNvPr>
+          <p:cNvSpPr>
+            <a:spLocks noGrp="1"/>
+          </p:cNvSpPr>
+          <p:nvPr>
+            <p:ph type="title"/>
+          </p:nvPr>
+        </p:nvSpPr>
+        <p:spPr/>
+        <p:txBody>
+          <a:bodyPr/>
+          <a:lstStyle/>
+          <a:p>
+            <a:r>
+              <a:rPr lang="en-US" dirty="0"/>
+              <a:t>Sources </a:t>
+            </a:r>
+          </a:p>
+        </p:txBody>
+      </p:sp>
+      <p:sp>
+        <p:nvSpPr>
+          <p:cNvPr id="3" name="Content Placeholder 2">
+            <a:extLst>
+              <a:ext uri="{FF2B5EF4-FFF2-40B4-BE49-F238E27FC236}">
+                <a16:creationId xmlns:a16="http://schemas.microsoft.com/office/drawing/2014/main" id="{81D600BF-F155-407F-ACE0-F887C21236EE}"/>
+              </a:ext>
+            </a:extLst>
+          </p:cNvPr>
+          <p:cNvSpPr>
+            <a:spLocks noGrp="1"/>
+          </p:cNvSpPr>
+          <p:nvPr>
+            <p:ph idx="1"/>
+          </p:nvPr>
+        </p:nvSpPr>
+        <p:spPr/>
+        <p:txBody>
+          <a:bodyPr>
+            <a:normAutofit/>
+          </a:bodyPr>
+          <a:lstStyle/>
+          <a:p>
+            <a:pPr marL="0" indent="0">
+              <a:buNone/>
+            </a:pPr>
+            <a:r>
+              <a:rPr lang="en-US" sz="2000" dirty="0"/>
+              <a:t>Coronavirus</a:t>
+            </a:r>
+          </a:p>
+          <a:p>
+            <a:r>
+              <a:rPr lang="en-US" sz="2000" dirty="0">
+                <a:hlinkClick r:id="rId2"/>
+              </a:rPr>
+              <a:t>https://www.cdc.gov/coronavirus/types.html</a:t>
+            </a:r>
+            <a:endParaRPr lang="en-US" sz="2000" dirty="0"/>
+          </a:p>
+          <a:p>
+            <a:r>
+              <a:rPr lang="en-US" sz="2000" dirty="0">
+                <a:hlinkClick r:id="rId3"/>
+              </a:rPr>
+              <a:t>https://www.cdc.gov/media/subtopic/images.htm</a:t>
+            </a:r>
+            <a:endParaRPr lang="en-US" sz="2000" dirty="0"/>
+          </a:p>
+          <a:p>
+            <a:r>
+              <a:rPr lang="en-US" sz="2000" dirty="0">
+                <a:hlinkClick r:id="rId4"/>
+              </a:rPr>
+              <a:t>https://coronavirus.jhu.edu/map.html</a:t>
+            </a:r>
+            <a:endParaRPr lang="en-US" sz="2000" dirty="0"/>
+          </a:p>
+        </p:txBody>
+      </p:sp>
+    </p:spTree>
+    <p:extLst>
+      <p:ext uri="{BB962C8B-B14F-4D97-AF65-F5344CB8AC3E}">
+        <p14:creationId xmlns:p14="http://schemas.microsoft.com/office/powerpoint/2010/main" val="1276680627"/>
+      </p:ext>
+    </p:extLst>
+  </p:cSld>
+  <p:clrMapOvr>
+    <a:masterClrMapping/>
+  </p:clrMapOvr>
+</p:sld>
+</file>
+
 <file path=ppt/slides/slide2.xml><?xml version="1.0" encoding="utf-8"?>
 <p:sld xmlns:a="http://schemas.openxmlformats.org/drawingml/2006/main" xmlns:r="http://schemas.openxmlformats.org/officeDocument/2006/relationships" xmlns:p="http://schemas.openxmlformats.org/presentationml/2006/main">
   <p:cSld>
@@ -5198,7 +5536,7 @@
           <p:cNvPr id="2" name="Title 1">
             <a:extLst>
               <a:ext uri="{FF2B5EF4-FFF2-40B4-BE49-F238E27FC236}">
-                <a16:creationId xmlns:a16="http://schemas.microsoft.com/office/drawing/2014/main" id="{2385F15A-0D6A-4078-B7AC-40B46686C7DE}"/>
+                <a16:creationId xmlns:a16="http://schemas.microsoft.com/office/drawing/2014/main" id="{AE3B0C92-8C33-47A9-94A2-801A38F6B3E0}"/>
               </a:ext>
             </a:extLst>
           </p:cNvPr>
@@ -5209,14 +5547,19 @@
             <p:ph type="title"/>
           </p:nvPr>
         </p:nvSpPr>
-        <p:spPr/>
+        <p:spPr>
+          <a:xfrm>
+            <a:off x="838200" y="365125"/>
+            <a:ext cx="10515600" cy="1711325"/>
+          </a:xfrm>
+        </p:spPr>
         <p:txBody>
           <a:bodyPr/>
           <a:lstStyle/>
           <a:p>
             <a:r>
               <a:rPr lang="en-US" dirty="0"/>
-              <a:t>Sources </a:t>
+              <a:t>QN: Are the homeless cases equal to the general public cases.</a:t>
             </a:r>
           </a:p>
         </p:txBody>
@@ -5226,7 +5569,7 @@
           <p:cNvPr id="3" name="Content Placeholder 2">
             <a:extLst>
               <a:ext uri="{FF2B5EF4-FFF2-40B4-BE49-F238E27FC236}">
-                <a16:creationId xmlns:a16="http://schemas.microsoft.com/office/drawing/2014/main" id="{81D600BF-F155-407F-ACE0-F887C21236EE}"/>
+                <a16:creationId xmlns:a16="http://schemas.microsoft.com/office/drawing/2014/main" id="{9875D5FB-597C-43A6-B437-0B3C198EC566}"/>
               </a:ext>
             </a:extLst>
           </p:cNvPr>
@@ -5237,54 +5580,40 @@
             <p:ph idx="1"/>
           </p:nvPr>
         </p:nvSpPr>
-        <p:spPr/>
-        <p:txBody>
-          <a:bodyPr>
-            <a:normAutofit/>
-          </a:bodyPr>
-          <a:lstStyle/>
-          <a:p>
-            <a:pPr marL="0" indent="0">
-              <a:buNone/>
-            </a:pPr>
-            <a:r>
-              <a:rPr lang="en-US" sz="2000" dirty="0"/>
-              <a:t>Coronavirus</a:t>
-            </a:r>
-          </a:p>
-          <a:p>
-            <a:r>
-              <a:rPr lang="en-US" sz="2000" dirty="0">
-                <a:hlinkClick r:id="rId2"/>
-              </a:rPr>
-              <a:t>https://www.cdc.gov/coronavirus/types.html</a:t>
-            </a:r>
-            <a:endParaRPr lang="en-US" sz="2000" dirty="0"/>
-          </a:p>
-          <a:p>
-            <a:r>
-              <a:rPr lang="en-US" sz="2000" dirty="0">
-                <a:hlinkClick r:id="rId3"/>
-              </a:rPr>
-              <a:t>https://www.cdc.gov/media/subtopic/images.htm</a:t>
-            </a:r>
-            <a:endParaRPr lang="en-US" sz="2000" dirty="0"/>
-          </a:p>
-          <a:p>
-            <a:r>
-              <a:rPr lang="en-US" sz="2000" dirty="0">
-                <a:hlinkClick r:id="rId4"/>
-              </a:rPr>
-              <a:t>https://coronavirus.jhu.edu/map.html</a:t>
-            </a:r>
-            <a:endParaRPr lang="en-US" sz="2000" dirty="0"/>
+        <p:spPr>
+          <a:xfrm>
+            <a:off x="838200" y="2400299"/>
+            <a:ext cx="10515600" cy="3776663"/>
+          </a:xfrm>
+        </p:spPr>
+        <p:txBody>
+          <a:bodyPr/>
+          <a:lstStyle/>
+          <a:p>
+            <a:r>
+              <a:rPr lang="en-US" dirty="0"/>
+              <a:t>We ran a one proportional z-test </a:t>
+            </a:r>
+          </a:p>
+          <a:p>
+            <a:pPr lvl="1"/>
+            <a:r>
+              <a:rPr lang="en-US" dirty="0"/>
+              <a:t>A one proportion z-test is used to compare an observed proportion to a theoretical one, when there are only 2 categories</a:t>
+            </a:r>
+          </a:p>
+          <a:p>
+            <a:r>
+              <a:rPr lang="en-US" dirty="0"/>
+              <a:t>We discovered that , the homeless cases are not equal to the general public cases. In fact that the homeless cases are only 3.8% of the positive COVID19 cases observed in San Francisco. </a:t>
+            </a:r>
           </a:p>
         </p:txBody>
       </p:sp>
     </p:spTree>
     <p:extLst>
       <p:ext uri="{BB962C8B-B14F-4D97-AF65-F5344CB8AC3E}">
-        <p14:creationId xmlns:p14="http://schemas.microsoft.com/office/powerpoint/2010/main" val="1276680627"/>
+        <p14:creationId xmlns:p14="http://schemas.microsoft.com/office/powerpoint/2010/main" val="2766681524"/>
       </p:ext>
     </p:extLst>
   </p:cSld>

</xml_diff>

<commit_message>
More edits to ppt
</commit_message>
<xml_diff>
--- a/RecoverdDFTppt.pptx
+++ b/RecoverdDFTppt.pptx
@@ -5,21 +5,26 @@
     <p:sldMasterId id="2147483648" r:id="rId1"/>
   </p:sldMasterIdLst>
   <p:notesMasterIdLst>
-    <p:notesMasterId r:id="rId14"/>
+    <p:notesMasterId r:id="rId19"/>
   </p:notesMasterIdLst>
   <p:sldIdLst>
     <p:sldId id="256" r:id="rId2"/>
-    <p:sldId id="257" r:id="rId3"/>
-    <p:sldId id="263" r:id="rId4"/>
-    <p:sldId id="264" r:id="rId5"/>
-    <p:sldId id="258" r:id="rId6"/>
-    <p:sldId id="259" r:id="rId7"/>
-    <p:sldId id="261" r:id="rId8"/>
-    <p:sldId id="262" r:id="rId9"/>
-    <p:sldId id="265" r:id="rId10"/>
-    <p:sldId id="267" r:id="rId11"/>
-    <p:sldId id="266" r:id="rId12"/>
-    <p:sldId id="260" r:id="rId13"/>
+    <p:sldId id="268" r:id="rId3"/>
+    <p:sldId id="269" r:id="rId4"/>
+    <p:sldId id="270" r:id="rId5"/>
+    <p:sldId id="257" r:id="rId6"/>
+    <p:sldId id="258" r:id="rId7"/>
+    <p:sldId id="259" r:id="rId8"/>
+    <p:sldId id="261" r:id="rId9"/>
+    <p:sldId id="262" r:id="rId10"/>
+    <p:sldId id="271" r:id="rId11"/>
+    <p:sldId id="272" r:id="rId12"/>
+    <p:sldId id="265" r:id="rId13"/>
+    <p:sldId id="267" r:id="rId14"/>
+    <p:sldId id="266" r:id="rId15"/>
+    <p:sldId id="273" r:id="rId16"/>
+    <p:sldId id="275" r:id="rId17"/>
+    <p:sldId id="260" r:id="rId18"/>
   </p:sldIdLst>
   <p:sldSz cx="12192000" cy="6858000"/>
   <p:notesSz cx="6858000" cy="9144000"/>
@@ -552,7 +557,7 @@
           <a:p>
             <a:fld id="{9601AF2B-5FCD-47A0-825D-A4952FFF1367}" type="slidenum">
               <a:rPr lang="en-US" smtClean="0"/>
-              <a:t>2</a:t>
+              <a:t>5</a:t>
             </a:fld>
             <a:endParaRPr lang="en-US"/>
           </a:p>
@@ -648,7 +653,7 @@
           <a:p>
             <a:fld id="{9601AF2B-5FCD-47A0-825D-A4952FFF1367}" type="slidenum">
               <a:rPr lang="en-US" smtClean="0"/>
-              <a:t>8</a:t>
+              <a:t>9</a:t>
             </a:fld>
             <a:endParaRPr lang="en-US"/>
           </a:p>
@@ -3974,7 +3979,7 @@
           <p:cNvPr id="2" name="Title 1">
             <a:extLst>
               <a:ext uri="{FF2B5EF4-FFF2-40B4-BE49-F238E27FC236}">
-                <a16:creationId xmlns:a16="http://schemas.microsoft.com/office/drawing/2014/main" id="{AE3B0C92-8C33-47A9-94A2-801A38F6B3E0}"/>
+                <a16:creationId xmlns:a16="http://schemas.microsoft.com/office/drawing/2014/main" id="{0D283874-3EB5-432E-92F9-FB9C85F0ABC1}"/>
               </a:ext>
             </a:extLst>
           </p:cNvPr>
@@ -3985,42 +3990,15 @@
             <p:ph type="title"/>
           </p:nvPr>
         </p:nvSpPr>
-        <p:spPr>
-          <a:xfrm>
-            <a:off x="838200" y="365125"/>
-            <a:ext cx="10515600" cy="2035174"/>
-          </a:xfrm>
-        </p:spPr>
-        <p:txBody>
-          <a:bodyPr>
-            <a:normAutofit fontScale="90000"/>
-          </a:bodyPr>
+        <p:spPr/>
+        <p:txBody>
+          <a:bodyPr/>
           <a:lstStyle/>
           <a:p>
             <a:r>
               <a:rPr lang="en-US" dirty="0"/>
-              <a:t>QN: </a:t>
-            </a:r>
-            <a:r>
-              <a:rPr lang="en-US" b="1" i="0" dirty="0">
-                <a:solidFill>
-                  <a:srgbClr val="000000"/>
-                </a:solidFill>
-                <a:effectLst/>
-                <a:latin typeface="Helvetica Neue"/>
-              </a:rPr>
-              <a:t> </a:t>
-            </a:r>
-            <a:r>
-              <a:rPr lang="en-US" i="0" dirty="0">
-                <a:solidFill>
-                  <a:srgbClr val="000000"/>
-                </a:solidFill>
-                <a:effectLst/>
-              </a:rPr>
-              <a:t>Are the number of homeless cases affecting the general public. Are the homeless spreading COVID19 because they have no homes?</a:t>
-            </a:r>
-            <a:endParaRPr lang="en-US" dirty="0"/>
+              <a:t>Methods</a:t>
+            </a:r>
           </a:p>
         </p:txBody>
       </p:sp>
@@ -4029,7 +4007,7 @@
           <p:cNvPr id="3" name="Content Placeholder 2">
             <a:extLst>
               <a:ext uri="{FF2B5EF4-FFF2-40B4-BE49-F238E27FC236}">
-                <a16:creationId xmlns:a16="http://schemas.microsoft.com/office/drawing/2014/main" id="{9875D5FB-597C-43A6-B437-0B3C198EC566}"/>
+                <a16:creationId xmlns:a16="http://schemas.microsoft.com/office/drawing/2014/main" id="{7BDADDF7-59DA-41D7-944C-AC199D95E71B}"/>
               </a:ext>
             </a:extLst>
           </p:cNvPr>
@@ -4040,38 +4018,57 @@
             <p:ph idx="1"/>
           </p:nvPr>
         </p:nvSpPr>
-        <p:spPr>
-          <a:xfrm>
-            <a:off x="838200" y="2400299"/>
-            <a:ext cx="10515600" cy="3776663"/>
-          </a:xfrm>
-        </p:spPr>
+        <p:spPr/>
         <p:txBody>
           <a:bodyPr/>
           <a:lstStyle/>
           <a:p>
             <a:r>
               <a:rPr lang="en-US" dirty="0"/>
-              <a:t>We ran linear regression predictive analysis.</a:t>
+              <a:t>Details about data used </a:t>
+            </a:r>
+          </a:p>
+          <a:p>
+            <a:r>
+              <a:rPr lang="en-US" dirty="0"/>
+              <a:t>What we did to :</a:t>
             </a:r>
           </a:p>
           <a:p>
             <a:pPr lvl="1"/>
             <a:r>
               <a:rPr lang="en-US" dirty="0"/>
-              <a:t>Linear regression will be used to explain the relationship between the homeless population and the general public population.</a:t>
-            </a:r>
-          </a:p>
-          <a:p>
+              <a:t>Gather/find data</a:t>
+            </a:r>
+          </a:p>
+          <a:p>
+            <a:pPr lvl="1"/>
+            <a:r>
+              <a:rPr lang="en-US" dirty="0" err="1"/>
+              <a:t>Manupilate</a:t>
+            </a:r>
             <a:r>
               <a:rPr lang="en-US" dirty="0"/>
-              <a:t>We discovered that the homeless population was responsible for 996% of the spread of COVID19 to the general public. The 4% can be explained by other factors. </a:t>
-            </a:r>
-          </a:p>
-          <a:p>
+              <a:t>/wrangle data </a:t>
+            </a:r>
+          </a:p>
+          <a:p>
+            <a:pPr lvl="1"/>
             <a:r>
               <a:rPr lang="en-US" dirty="0"/>
-              <a:t>How ever, we found a lot of variance, the data was not evenly distributed.</a:t>
+              <a:t>Create new variables</a:t>
+            </a:r>
+          </a:p>
+          <a:p>
+            <a:r>
+              <a:rPr lang="en-US" dirty="0"/>
+              <a:t>Important variables and their summary statistics</a:t>
+            </a:r>
+          </a:p>
+          <a:p>
+            <a:r>
+              <a:rPr lang="en-US" dirty="0"/>
+              <a:t>Sample size</a:t>
             </a:r>
           </a:p>
         </p:txBody>
@@ -4079,7 +4076,7 @@
     </p:spTree>
     <p:extLst>
       <p:ext uri="{BB962C8B-B14F-4D97-AF65-F5344CB8AC3E}">
-        <p14:creationId xmlns:p14="http://schemas.microsoft.com/office/powerpoint/2010/main" val="2763260367"/>
+        <p14:creationId xmlns:p14="http://schemas.microsoft.com/office/powerpoint/2010/main" val="1409966681"/>
       </p:ext>
     </p:extLst>
   </p:cSld>
@@ -4111,6 +4108,113 @@
           <p:cNvPr id="2" name="Title 1">
             <a:extLst>
               <a:ext uri="{FF2B5EF4-FFF2-40B4-BE49-F238E27FC236}">
+                <a16:creationId xmlns:a16="http://schemas.microsoft.com/office/drawing/2014/main" id="{92AD08EE-AAB8-49E7-B2E3-8055A958E767}"/>
+              </a:ext>
+            </a:extLst>
+          </p:cNvPr>
+          <p:cNvSpPr>
+            <a:spLocks noGrp="1"/>
+          </p:cNvSpPr>
+          <p:nvPr>
+            <p:ph type="title"/>
+          </p:nvPr>
+        </p:nvSpPr>
+        <p:spPr/>
+        <p:txBody>
+          <a:bodyPr/>
+          <a:lstStyle/>
+          <a:p>
+            <a:r>
+              <a:rPr lang="en-US" dirty="0"/>
+              <a:t>Results </a:t>
+            </a:r>
+          </a:p>
+        </p:txBody>
+      </p:sp>
+      <p:sp>
+        <p:nvSpPr>
+          <p:cNvPr id="3" name="Content Placeholder 2">
+            <a:extLst>
+              <a:ext uri="{FF2B5EF4-FFF2-40B4-BE49-F238E27FC236}">
+                <a16:creationId xmlns:a16="http://schemas.microsoft.com/office/drawing/2014/main" id="{A40E466E-DF68-40BF-8528-8EC5815DD9E6}"/>
+              </a:ext>
+            </a:extLst>
+          </p:cNvPr>
+          <p:cNvSpPr>
+            <a:spLocks noGrp="1"/>
+          </p:cNvSpPr>
+          <p:nvPr>
+            <p:ph idx="1"/>
+          </p:nvPr>
+        </p:nvSpPr>
+        <p:spPr/>
+        <p:txBody>
+          <a:bodyPr/>
+          <a:lstStyle/>
+          <a:p>
+            <a:r>
+              <a:rPr lang="en-US" dirty="0"/>
+              <a:t>This is the format that the results will take </a:t>
+            </a:r>
+          </a:p>
+          <a:p>
+            <a:pPr lvl="1"/>
+            <a:r>
+              <a:rPr lang="en-US" dirty="0"/>
+              <a:t> the question </a:t>
+            </a:r>
+          </a:p>
+          <a:p>
+            <a:pPr lvl="1"/>
+            <a:r>
+              <a:rPr lang="en-US" dirty="0"/>
+              <a:t>The Analysis used </a:t>
+            </a:r>
+          </a:p>
+          <a:p>
+            <a:pPr lvl="1"/>
+            <a:r>
+              <a:rPr lang="en-US" dirty="0"/>
+              <a:t>What are the observations and conclusions from the tests done </a:t>
+            </a:r>
+          </a:p>
+        </p:txBody>
+      </p:sp>
+    </p:spTree>
+    <p:extLst>
+      <p:ext uri="{BB962C8B-B14F-4D97-AF65-F5344CB8AC3E}">
+        <p14:creationId xmlns:p14="http://schemas.microsoft.com/office/powerpoint/2010/main" val="3204704411"/>
+      </p:ext>
+    </p:extLst>
+  </p:cSld>
+  <p:clrMapOvr>
+    <a:masterClrMapping/>
+  </p:clrMapOvr>
+</p:sld>
+</file>
+
+<file path=ppt/slides/slide12.xml><?xml version="1.0" encoding="utf-8"?>
+<p:sld xmlns:a="http://schemas.openxmlformats.org/drawingml/2006/main" xmlns:r="http://schemas.openxmlformats.org/officeDocument/2006/relationships" xmlns:p="http://schemas.openxmlformats.org/presentationml/2006/main">
+  <p:cSld>
+    <p:spTree>
+      <p:nvGrpSpPr>
+        <p:cNvPr id="1" name=""/>
+        <p:cNvGrpSpPr/>
+        <p:nvPr/>
+      </p:nvGrpSpPr>
+      <p:grpSpPr>
+        <a:xfrm>
+          <a:off x="0" y="0"/>
+          <a:ext cx="0" cy="0"/>
+          <a:chOff x="0" y="0"/>
+          <a:chExt cx="0" cy="0"/>
+        </a:xfrm>
+      </p:grpSpPr>
+      <p:sp>
+        <p:nvSpPr>
+          <p:cNvPr id="2" name="Title 1">
+            <a:extLst>
+              <a:ext uri="{FF2B5EF4-FFF2-40B4-BE49-F238E27FC236}">
                 <a16:creationId xmlns:a16="http://schemas.microsoft.com/office/drawing/2014/main" id="{AE3B0C92-8C33-47A9-94A2-801A38F6B3E0}"/>
               </a:ext>
             </a:extLst>
@@ -4122,12 +4226,261 @@
             <p:ph type="title"/>
           </p:nvPr>
         </p:nvSpPr>
+        <p:spPr>
+          <a:xfrm>
+            <a:off x="838200" y="365125"/>
+            <a:ext cx="10515600" cy="1711325"/>
+          </a:xfrm>
+        </p:spPr>
+        <p:txBody>
+          <a:bodyPr/>
+          <a:lstStyle/>
+          <a:p>
+            <a:r>
+              <a:rPr lang="en-US" dirty="0"/>
+              <a:t>QN: Are the homeless cases equal to the general public cases.</a:t>
+            </a:r>
+          </a:p>
+        </p:txBody>
+      </p:sp>
+      <p:sp>
+        <p:nvSpPr>
+          <p:cNvPr id="3" name="Content Placeholder 2">
+            <a:extLst>
+              <a:ext uri="{FF2B5EF4-FFF2-40B4-BE49-F238E27FC236}">
+                <a16:creationId xmlns:a16="http://schemas.microsoft.com/office/drawing/2014/main" id="{9875D5FB-597C-43A6-B437-0B3C198EC566}"/>
+              </a:ext>
+            </a:extLst>
+          </p:cNvPr>
+          <p:cNvSpPr>
+            <a:spLocks noGrp="1"/>
+          </p:cNvSpPr>
+          <p:nvPr>
+            <p:ph idx="1"/>
+          </p:nvPr>
+        </p:nvSpPr>
+        <p:spPr>
+          <a:xfrm>
+            <a:off x="838200" y="2400299"/>
+            <a:ext cx="10515600" cy="3776663"/>
+          </a:xfrm>
+        </p:spPr>
+        <p:txBody>
+          <a:bodyPr/>
+          <a:lstStyle/>
+          <a:p>
+            <a:r>
+              <a:rPr lang="en-US" dirty="0"/>
+              <a:t>We ran a one proportional z-test </a:t>
+            </a:r>
+          </a:p>
+          <a:p>
+            <a:pPr lvl="1"/>
+            <a:r>
+              <a:rPr lang="en-US" dirty="0"/>
+              <a:t>A one proportion z-test is used to compare an observed proportion to a theoretical one, when there are only 2 categories</a:t>
+            </a:r>
+          </a:p>
+          <a:p>
+            <a:r>
+              <a:rPr lang="en-US" dirty="0"/>
+              <a:t>We discovered that , the homeless cases are not equal to the general public cases. In fact that the homeless cases are only 3.8% of the positive COVID19 cases observed in San Francisco. </a:t>
+            </a:r>
+          </a:p>
+        </p:txBody>
+      </p:sp>
+    </p:spTree>
+    <p:extLst>
+      <p:ext uri="{BB962C8B-B14F-4D97-AF65-F5344CB8AC3E}">
+        <p14:creationId xmlns:p14="http://schemas.microsoft.com/office/powerpoint/2010/main" val="2766681524"/>
+      </p:ext>
+    </p:extLst>
+  </p:cSld>
+  <p:clrMapOvr>
+    <a:masterClrMapping/>
+  </p:clrMapOvr>
+</p:sld>
+</file>
+
+<file path=ppt/slides/slide13.xml><?xml version="1.0" encoding="utf-8"?>
+<p:sld xmlns:a="http://schemas.openxmlformats.org/drawingml/2006/main" xmlns:r="http://schemas.openxmlformats.org/officeDocument/2006/relationships" xmlns:p="http://schemas.openxmlformats.org/presentationml/2006/main">
+  <p:cSld>
+    <p:spTree>
+      <p:nvGrpSpPr>
+        <p:cNvPr id="1" name=""/>
+        <p:cNvGrpSpPr/>
+        <p:nvPr/>
+      </p:nvGrpSpPr>
+      <p:grpSpPr>
+        <a:xfrm>
+          <a:off x="0" y="0"/>
+          <a:ext cx="0" cy="0"/>
+          <a:chOff x="0" y="0"/>
+          <a:chExt cx="0" cy="0"/>
+        </a:xfrm>
+      </p:grpSpPr>
+      <p:sp>
+        <p:nvSpPr>
+          <p:cNvPr id="2" name="Title 1">
+            <a:extLst>
+              <a:ext uri="{FF2B5EF4-FFF2-40B4-BE49-F238E27FC236}">
+                <a16:creationId xmlns:a16="http://schemas.microsoft.com/office/drawing/2014/main" id="{AE3B0C92-8C33-47A9-94A2-801A38F6B3E0}"/>
+              </a:ext>
+            </a:extLst>
+          </p:cNvPr>
+          <p:cNvSpPr>
+            <a:spLocks noGrp="1"/>
+          </p:cNvSpPr>
+          <p:nvPr>
+            <p:ph type="title"/>
+          </p:nvPr>
+        </p:nvSpPr>
+        <p:spPr>
+          <a:xfrm>
+            <a:off x="838200" y="365125"/>
+            <a:ext cx="10515600" cy="2035174"/>
+          </a:xfrm>
+        </p:spPr>
+        <p:txBody>
+          <a:bodyPr>
+            <a:normAutofit fontScale="90000"/>
+          </a:bodyPr>
+          <a:lstStyle/>
+          <a:p>
+            <a:r>
+              <a:rPr lang="en-US" dirty="0"/>
+              <a:t>QN: </a:t>
+            </a:r>
+            <a:r>
+              <a:rPr lang="en-US" b="1" i="0" dirty="0">
+                <a:solidFill>
+                  <a:srgbClr val="000000"/>
+                </a:solidFill>
+                <a:effectLst/>
+                <a:latin typeface="Helvetica Neue"/>
+              </a:rPr>
+              <a:t> </a:t>
+            </a:r>
+            <a:r>
+              <a:rPr lang="en-US" i="0" dirty="0">
+                <a:solidFill>
+                  <a:srgbClr val="000000"/>
+                </a:solidFill>
+                <a:effectLst/>
+              </a:rPr>
+              <a:t>Are the number of homeless cases affecting the general public. Are the homeless spreading COVID19 because they have no homes?</a:t>
+            </a:r>
+            <a:endParaRPr lang="en-US" dirty="0"/>
+          </a:p>
+        </p:txBody>
+      </p:sp>
+      <p:sp>
+        <p:nvSpPr>
+          <p:cNvPr id="3" name="Content Placeholder 2">
+            <a:extLst>
+              <a:ext uri="{FF2B5EF4-FFF2-40B4-BE49-F238E27FC236}">
+                <a16:creationId xmlns:a16="http://schemas.microsoft.com/office/drawing/2014/main" id="{9875D5FB-597C-43A6-B437-0B3C198EC566}"/>
+              </a:ext>
+            </a:extLst>
+          </p:cNvPr>
+          <p:cNvSpPr>
+            <a:spLocks noGrp="1"/>
+          </p:cNvSpPr>
+          <p:nvPr>
+            <p:ph idx="1"/>
+          </p:nvPr>
+        </p:nvSpPr>
+        <p:spPr>
+          <a:xfrm>
+            <a:off x="838200" y="2400299"/>
+            <a:ext cx="10515600" cy="3776663"/>
+          </a:xfrm>
+        </p:spPr>
+        <p:txBody>
+          <a:bodyPr/>
+          <a:lstStyle/>
+          <a:p>
+            <a:r>
+              <a:rPr lang="en-US" dirty="0"/>
+              <a:t>We ran linear regression predictive analysis.</a:t>
+            </a:r>
+          </a:p>
+          <a:p>
+            <a:pPr lvl="1"/>
+            <a:r>
+              <a:rPr lang="en-US" dirty="0"/>
+              <a:t>Linear regression will be used to explain the relationship between the homeless population and the general public population.</a:t>
+            </a:r>
+          </a:p>
+          <a:p>
+            <a:r>
+              <a:rPr lang="en-US" dirty="0"/>
+              <a:t>We discovered that the homeless population was responsible for 996% of the spread of COVID19 to the general public. The 4% can be explained by other factors. </a:t>
+            </a:r>
+          </a:p>
+          <a:p>
+            <a:r>
+              <a:rPr lang="en-US" dirty="0"/>
+              <a:t>How ever, we found a lot of variance, the data was not evenly distributed.</a:t>
+            </a:r>
+          </a:p>
+        </p:txBody>
+      </p:sp>
+    </p:spTree>
+    <p:extLst>
+      <p:ext uri="{BB962C8B-B14F-4D97-AF65-F5344CB8AC3E}">
+        <p14:creationId xmlns:p14="http://schemas.microsoft.com/office/powerpoint/2010/main" val="2763260367"/>
+      </p:ext>
+    </p:extLst>
+  </p:cSld>
+  <p:clrMapOvr>
+    <a:masterClrMapping/>
+  </p:clrMapOvr>
+</p:sld>
+</file>
+
+<file path=ppt/slides/slide14.xml><?xml version="1.0" encoding="utf-8"?>
+<p:sld xmlns:a="http://schemas.openxmlformats.org/drawingml/2006/main" xmlns:r="http://schemas.openxmlformats.org/officeDocument/2006/relationships" xmlns:p="http://schemas.openxmlformats.org/presentationml/2006/main">
+  <p:cSld>
+    <p:spTree>
+      <p:nvGrpSpPr>
+        <p:cNvPr id="1" name=""/>
+        <p:cNvGrpSpPr/>
+        <p:nvPr/>
+      </p:nvGrpSpPr>
+      <p:grpSpPr>
+        <a:xfrm>
+          <a:off x="0" y="0"/>
+          <a:ext cx="0" cy="0"/>
+          <a:chOff x="0" y="0"/>
+          <a:chExt cx="0" cy="0"/>
+        </a:xfrm>
+      </p:grpSpPr>
+      <p:sp>
+        <p:nvSpPr>
+          <p:cNvPr id="2" name="Title 1">
+            <a:extLst>
+              <a:ext uri="{FF2B5EF4-FFF2-40B4-BE49-F238E27FC236}">
+                <a16:creationId xmlns:a16="http://schemas.microsoft.com/office/drawing/2014/main" id="{AE3B0C92-8C33-47A9-94A2-801A38F6B3E0}"/>
+              </a:ext>
+            </a:extLst>
+          </p:cNvPr>
+          <p:cNvSpPr>
+            <a:spLocks noGrp="1"/>
+          </p:cNvSpPr>
+          <p:nvPr>
+            <p:ph type="title"/>
+          </p:nvPr>
+        </p:nvSpPr>
         <p:spPr/>
         <p:txBody>
           <a:bodyPr/>
           <a:lstStyle/>
           <a:p>
-            <a:endParaRPr lang="en-US"/>
+            <a:r>
+              <a:rPr lang="en-US" dirty="0"/>
+              <a:t>Summary </a:t>
+            </a:r>
           </a:p>
         </p:txBody>
       </p:sp>
@@ -4152,7 +4505,52 @@
           <a:bodyPr/>
           <a:lstStyle/>
           <a:p>
-            <a:endParaRPr lang="en-US"/>
+            <a:r>
+              <a:rPr lang="en-US" dirty="0"/>
+              <a:t>Here is a summary of our discoveries :</a:t>
+            </a:r>
+          </a:p>
+          <a:p>
+            <a:pPr lvl="1"/>
+            <a:r>
+              <a:rPr lang="en-US" dirty="0"/>
+              <a:t> Only 3.8% of COVID19 cases in San Francisco are homeless</a:t>
+            </a:r>
+          </a:p>
+          <a:p>
+            <a:pPr lvl="1"/>
+            <a:r>
+              <a:rPr lang="en-US" dirty="0"/>
+              <a:t>2.5% of the homeless population has been affect by COVID19</a:t>
+            </a:r>
+          </a:p>
+          <a:p>
+            <a:pPr lvl="1"/>
+            <a:r>
+              <a:rPr lang="en-US" dirty="0"/>
+              <a:t>Only 0.7% of the general public population has been affected by COVID19</a:t>
+            </a:r>
+          </a:p>
+          <a:p>
+            <a:pPr lvl="1"/>
+            <a:r>
+              <a:rPr lang="en-US" dirty="0"/>
+              <a:t>Homeless population has been affected 111% harder than the general public </a:t>
+            </a:r>
+          </a:p>
+          <a:p>
+            <a:pPr lvl="1"/>
+            <a:r>
+              <a:rPr lang="en-US" dirty="0"/>
+              <a:t>Towns that started out with fewer cases were faced wit an exponential growth in COVID19 cases</a:t>
+            </a:r>
+          </a:p>
+          <a:p>
+            <a:pPr lvl="1"/>
+            <a:r>
+              <a:rPr lang="en-US" dirty="0"/>
+              <a:t>The homeless population are spreading COVID19 to the general public because they do not have homes and resources.</a:t>
+            </a:r>
           </a:p>
         </p:txBody>
       </p:sp>
@@ -4169,7 +4567,171 @@
 </p:sld>
 </file>
 
-<file path=ppt/slides/slide12.xml><?xml version="1.0" encoding="utf-8"?>
+<file path=ppt/slides/slide15.xml><?xml version="1.0" encoding="utf-8"?>
+<p:sld xmlns:a="http://schemas.openxmlformats.org/drawingml/2006/main" xmlns:r="http://schemas.openxmlformats.org/officeDocument/2006/relationships" xmlns:p="http://schemas.openxmlformats.org/presentationml/2006/main">
+  <p:cSld>
+    <p:spTree>
+      <p:nvGrpSpPr>
+        <p:cNvPr id="1" name=""/>
+        <p:cNvGrpSpPr/>
+        <p:nvPr/>
+      </p:nvGrpSpPr>
+      <p:grpSpPr>
+        <a:xfrm>
+          <a:off x="0" y="0"/>
+          <a:ext cx="0" cy="0"/>
+          <a:chOff x="0" y="0"/>
+          <a:chExt cx="0" cy="0"/>
+        </a:xfrm>
+      </p:grpSpPr>
+      <p:sp>
+        <p:nvSpPr>
+          <p:cNvPr id="2" name="Title 1">
+            <a:extLst>
+              <a:ext uri="{FF2B5EF4-FFF2-40B4-BE49-F238E27FC236}">
+                <a16:creationId xmlns:a16="http://schemas.microsoft.com/office/drawing/2014/main" id="{0B184ABF-6700-42B4-8DC2-A9C553802349}"/>
+              </a:ext>
+            </a:extLst>
+          </p:cNvPr>
+          <p:cNvSpPr>
+            <a:spLocks noGrp="1"/>
+          </p:cNvSpPr>
+          <p:nvPr>
+            <p:ph type="title"/>
+          </p:nvPr>
+        </p:nvSpPr>
+        <p:spPr/>
+        <p:txBody>
+          <a:bodyPr/>
+          <a:lstStyle/>
+          <a:p>
+            <a:r>
+              <a:rPr lang="en-US" dirty="0"/>
+              <a:t>Conclusions </a:t>
+            </a:r>
+          </a:p>
+        </p:txBody>
+      </p:sp>
+      <p:sp>
+        <p:nvSpPr>
+          <p:cNvPr id="3" name="Content Placeholder 2">
+            <a:extLst>
+              <a:ext uri="{FF2B5EF4-FFF2-40B4-BE49-F238E27FC236}">
+                <a16:creationId xmlns:a16="http://schemas.microsoft.com/office/drawing/2014/main" id="{F8FF6509-9566-4270-9830-E9736732D511}"/>
+              </a:ext>
+            </a:extLst>
+          </p:cNvPr>
+          <p:cNvSpPr>
+            <a:spLocks noGrp="1"/>
+          </p:cNvSpPr>
+          <p:nvPr>
+            <p:ph idx="1"/>
+          </p:nvPr>
+        </p:nvSpPr>
+        <p:spPr/>
+        <p:txBody>
+          <a:bodyPr/>
+          <a:lstStyle/>
+          <a:p>
+            <a:r>
+              <a:rPr lang="en-US" dirty="0"/>
+              <a:t>How do our finding impact the world at large ?</a:t>
+            </a:r>
+          </a:p>
+          <a:p>
+            <a:r>
+              <a:rPr lang="en-US" dirty="0"/>
+              <a:t>What’s important about this work?</a:t>
+            </a:r>
+          </a:p>
+          <a:p>
+            <a:r>
+              <a:rPr lang="en-US" dirty="0"/>
+              <a:t>Big picture information</a:t>
+            </a:r>
+          </a:p>
+        </p:txBody>
+      </p:sp>
+    </p:spTree>
+    <p:extLst>
+      <p:ext uri="{BB962C8B-B14F-4D97-AF65-F5344CB8AC3E}">
+        <p14:creationId xmlns:p14="http://schemas.microsoft.com/office/powerpoint/2010/main" val="116506263"/>
+      </p:ext>
+    </p:extLst>
+  </p:cSld>
+  <p:clrMapOvr>
+    <a:masterClrMapping/>
+  </p:clrMapOvr>
+</p:sld>
+</file>
+
+<file path=ppt/slides/slide16.xml><?xml version="1.0" encoding="utf-8"?>
+<p:sld xmlns:a="http://schemas.openxmlformats.org/drawingml/2006/main" xmlns:r="http://schemas.openxmlformats.org/officeDocument/2006/relationships" xmlns:p="http://schemas.openxmlformats.org/presentationml/2006/main">
+  <p:cSld>
+    <p:spTree>
+      <p:nvGrpSpPr>
+        <p:cNvPr id="1" name=""/>
+        <p:cNvGrpSpPr/>
+        <p:nvPr/>
+      </p:nvGrpSpPr>
+      <p:grpSpPr>
+        <a:xfrm>
+          <a:off x="0" y="0"/>
+          <a:ext cx="0" cy="0"/>
+          <a:chOff x="0" y="0"/>
+          <a:chExt cx="0" cy="0"/>
+        </a:xfrm>
+      </p:grpSpPr>
+      <p:sp>
+        <p:nvSpPr>
+          <p:cNvPr id="2" name="Title 1">
+            <a:extLst>
+              <a:ext uri="{FF2B5EF4-FFF2-40B4-BE49-F238E27FC236}">
+                <a16:creationId xmlns:a16="http://schemas.microsoft.com/office/drawing/2014/main" id="{23AFA9E5-2E88-4817-9958-14EEE121A83B}"/>
+              </a:ext>
+            </a:extLst>
+          </p:cNvPr>
+          <p:cNvSpPr>
+            <a:spLocks noGrp="1"/>
+          </p:cNvSpPr>
+          <p:nvPr>
+            <p:ph type="title"/>
+          </p:nvPr>
+        </p:nvSpPr>
+        <p:spPr>
+          <a:xfrm>
+            <a:off x="838200" y="2270125"/>
+            <a:ext cx="10515600" cy="1325563"/>
+          </a:xfrm>
+        </p:spPr>
+        <p:txBody>
+          <a:bodyPr>
+            <a:noAutofit/>
+          </a:bodyPr>
+          <a:lstStyle/>
+          <a:p>
+            <a:pPr algn="ctr"/>
+            <a:r>
+              <a:rPr lang="en-US" sz="9600" dirty="0"/>
+              <a:t>QUESTIONS?</a:t>
+            </a:r>
+          </a:p>
+        </p:txBody>
+      </p:sp>
+    </p:spTree>
+    <p:extLst>
+      <p:ext uri="{BB962C8B-B14F-4D97-AF65-F5344CB8AC3E}">
+        <p14:creationId xmlns:p14="http://schemas.microsoft.com/office/powerpoint/2010/main" val="1088550288"/>
+      </p:ext>
+    </p:extLst>
+  </p:cSld>
+  <p:clrMapOvr>
+    <a:masterClrMapping/>
+  </p:clrMapOvr>
+</p:sld>
+</file>
+
+<file path=ppt/slides/slide17.xml><?xml version="1.0" encoding="utf-8"?>
 <p:sld xmlns:a="http://schemas.openxmlformats.org/drawingml/2006/main" xmlns:r="http://schemas.openxmlformats.org/officeDocument/2006/relationships" xmlns:p="http://schemas.openxmlformats.org/presentationml/2006/main">
   <p:cSld>
     <p:spTree>
@@ -4309,7 +4871,7 @@
           <p:cNvPr id="2" name="Title 1">
             <a:extLst>
               <a:ext uri="{FF2B5EF4-FFF2-40B4-BE49-F238E27FC236}">
-                <a16:creationId xmlns:a16="http://schemas.microsoft.com/office/drawing/2014/main" id="{8BFC824E-D1EC-4F94-9986-567B20CFA1E4}"/>
+                <a16:creationId xmlns:a16="http://schemas.microsoft.com/office/drawing/2014/main" id="{FEE53610-4C91-4759-B0D9-E8B590BE3506}"/>
               </a:ext>
             </a:extLst>
           </p:cNvPr>
@@ -4327,7 +4889,7 @@
           <a:p>
             <a:r>
               <a:rPr lang="en-US" dirty="0"/>
-              <a:t>Overview of the Presentation </a:t>
+              <a:t>Racheal</a:t>
             </a:r>
           </a:p>
         </p:txBody>
@@ -4337,7 +4899,7 @@
           <p:cNvPr id="3" name="Content Placeholder 2">
             <a:extLst>
               <a:ext uri="{FF2B5EF4-FFF2-40B4-BE49-F238E27FC236}">
-                <a16:creationId xmlns:a16="http://schemas.microsoft.com/office/drawing/2014/main" id="{EBB3FD2F-9977-4D9A-B6B5-CE9E743E0E66}"/>
+                <a16:creationId xmlns:a16="http://schemas.microsoft.com/office/drawing/2014/main" id="{3BD577B9-839F-4F83-8848-2656FE4E4323}"/>
               </a:ext>
             </a:extLst>
           </p:cNvPr>
@@ -4355,19 +4917,25 @@
           <a:p>
             <a:r>
               <a:rPr lang="en-US" dirty="0"/>
-              <a:t>What is COVID-19</a:t>
+              <a:t>Previous education </a:t>
             </a:r>
           </a:p>
           <a:p>
             <a:r>
               <a:rPr lang="en-US" dirty="0"/>
-              <a:t>What are the impacts of COVID-19 to the world in General</a:t>
+              <a:t>Employment or were you were last employed or subject matter expertise</a:t>
             </a:r>
           </a:p>
           <a:p>
             <a:r>
               <a:rPr lang="en-US" dirty="0"/>
-              <a:t>Why we chose California </a:t>
+              <a:t>What do you do in your free time </a:t>
+            </a:r>
+          </a:p>
+          <a:p>
+            <a:r>
+              <a:rPr lang="en-US" dirty="0"/>
+              <a:t>Favorite fruit</a:t>
             </a:r>
           </a:p>
         </p:txBody>
@@ -4375,7 +4943,7 @@
     </p:spTree>
     <p:extLst>
       <p:ext uri="{BB962C8B-B14F-4D97-AF65-F5344CB8AC3E}">
-        <p14:creationId xmlns:p14="http://schemas.microsoft.com/office/powerpoint/2010/main" val="4029123039"/>
+        <p14:creationId xmlns:p14="http://schemas.microsoft.com/office/powerpoint/2010/main" val="965260268"/>
       </p:ext>
     </p:extLst>
   </p:cSld>
@@ -4407,7 +4975,7 @@
           <p:cNvPr id="2" name="Title 1">
             <a:extLst>
               <a:ext uri="{FF2B5EF4-FFF2-40B4-BE49-F238E27FC236}">
-                <a16:creationId xmlns:a16="http://schemas.microsoft.com/office/drawing/2014/main" id="{46F4043B-3880-4E51-A104-492328CE5E0A}"/>
+                <a16:creationId xmlns:a16="http://schemas.microsoft.com/office/drawing/2014/main" id="{FEE53610-4C91-4759-B0D9-E8B590BE3506}"/>
               </a:ext>
             </a:extLst>
           </p:cNvPr>
@@ -4425,7 +4993,7 @@
           <a:p>
             <a:r>
               <a:rPr lang="en-US" dirty="0"/>
-              <a:t>Overview</a:t>
+              <a:t>Elijah</a:t>
             </a:r>
           </a:p>
         </p:txBody>
@@ -4435,7 +5003,7 @@
           <p:cNvPr id="3" name="Content Placeholder 2">
             <a:extLst>
               <a:ext uri="{FF2B5EF4-FFF2-40B4-BE49-F238E27FC236}">
-                <a16:creationId xmlns:a16="http://schemas.microsoft.com/office/drawing/2014/main" id="{86068946-1436-49DF-99C4-3099F7F18D30}"/>
+                <a16:creationId xmlns:a16="http://schemas.microsoft.com/office/drawing/2014/main" id="{3BD577B9-839F-4F83-8848-2656FE4E4323}"/>
               </a:ext>
             </a:extLst>
           </p:cNvPr>
@@ -4451,131 +5019,27 @@
           <a:bodyPr/>
           <a:lstStyle/>
           <a:p>
-            <a:pPr algn="l">
-              <a:buFont typeface="Arial" panose="020B0604020202020204" pitchFamily="34" charset="0"/>
-              <a:buChar char="•"/>
-            </a:pPr>
-            <a:r>
-              <a:rPr lang="en-US" b="0" i="0" dirty="0">
-                <a:solidFill>
-                  <a:srgbClr val="333333"/>
-                </a:solidFill>
-                <a:effectLst/>
-                <a:latin typeface="Montserrat"/>
-              </a:rPr>
-              <a:t>Title Slide</a:t>
-            </a:r>
-          </a:p>
-          <a:p>
-            <a:pPr algn="l">
-              <a:buFont typeface="Arial" panose="020B0604020202020204" pitchFamily="34" charset="0"/>
-              <a:buChar char="•"/>
-            </a:pPr>
-            <a:r>
-              <a:rPr lang="en-US" b="0" i="0" dirty="0">
-                <a:solidFill>
-                  <a:srgbClr val="333333"/>
-                </a:solidFill>
-                <a:effectLst/>
-                <a:latin typeface="Montserrat"/>
-              </a:rPr>
-              <a:t>Your Background</a:t>
-            </a:r>
-          </a:p>
-          <a:p>
-            <a:pPr algn="l">
-              <a:buFont typeface="Arial" panose="020B0604020202020204" pitchFamily="34" charset="0"/>
-              <a:buChar char="•"/>
-            </a:pPr>
-            <a:r>
-              <a:rPr lang="en-US" b="0" i="0" dirty="0">
-                <a:solidFill>
-                  <a:srgbClr val="333333"/>
-                </a:solidFill>
-                <a:effectLst/>
-                <a:latin typeface="Montserrat"/>
-              </a:rPr>
-              <a:t>Project Introduction / Background</a:t>
-            </a:r>
-          </a:p>
-          <a:p>
-            <a:pPr algn="l">
-              <a:buFont typeface="Arial" panose="020B0604020202020204" pitchFamily="34" charset="0"/>
-              <a:buChar char="•"/>
-            </a:pPr>
-            <a:r>
-              <a:rPr lang="en-US" b="0" i="0" dirty="0">
-                <a:solidFill>
-                  <a:srgbClr val="333333"/>
-                </a:solidFill>
-                <a:effectLst/>
-                <a:latin typeface="Montserrat"/>
-              </a:rPr>
-              <a:t>Methods</a:t>
-            </a:r>
-          </a:p>
-          <a:p>
-            <a:pPr algn="l">
-              <a:buFont typeface="Arial" panose="020B0604020202020204" pitchFamily="34" charset="0"/>
-              <a:buChar char="•"/>
-            </a:pPr>
-            <a:r>
-              <a:rPr lang="en-US" b="0" i="0" dirty="0">
-                <a:solidFill>
-                  <a:srgbClr val="333333"/>
-                </a:solidFill>
-                <a:effectLst/>
-                <a:latin typeface="Montserrat"/>
-              </a:rPr>
-              <a:t>Results</a:t>
-            </a:r>
-          </a:p>
-          <a:p>
-            <a:pPr algn="l">
-              <a:buFont typeface="Arial" panose="020B0604020202020204" pitchFamily="34" charset="0"/>
-              <a:buChar char="•"/>
-            </a:pPr>
-            <a:r>
-              <a:rPr lang="en-US" b="0" i="0" dirty="0">
-                <a:solidFill>
-                  <a:srgbClr val="333333"/>
-                </a:solidFill>
-                <a:effectLst/>
-                <a:latin typeface="Montserrat"/>
-              </a:rPr>
-              <a:t>Summary</a:t>
-            </a:r>
-          </a:p>
-          <a:p>
-            <a:pPr algn="l">
-              <a:buFont typeface="Arial" panose="020B0604020202020204" pitchFamily="34" charset="0"/>
-              <a:buChar char="•"/>
-            </a:pPr>
-            <a:r>
-              <a:rPr lang="en-US" b="0" i="0" dirty="0">
-                <a:solidFill>
-                  <a:srgbClr val="333333"/>
-                </a:solidFill>
-                <a:effectLst/>
-                <a:latin typeface="Montserrat"/>
-              </a:rPr>
-              <a:t>Conclusions</a:t>
-            </a:r>
-          </a:p>
-          <a:p>
-            <a:pPr algn="l">
-              <a:buFont typeface="Arial" panose="020B0604020202020204" pitchFamily="34" charset="0"/>
-              <a:buChar char="•"/>
-            </a:pPr>
-            <a:r>
-              <a:rPr lang="en-US" b="0" i="0" dirty="0">
-                <a:solidFill>
-                  <a:srgbClr val="333333"/>
-                </a:solidFill>
-                <a:effectLst/>
-                <a:latin typeface="Montserrat"/>
-              </a:rPr>
-              <a:t>Questions</a:t>
+            <a:r>
+              <a:rPr lang="en-US" dirty="0"/>
+              <a:t>Previous education </a:t>
+            </a:r>
+          </a:p>
+          <a:p>
+            <a:r>
+              <a:rPr lang="en-US" dirty="0"/>
+              <a:t>Employment or were you were last employed or subject matter expertise</a:t>
+            </a:r>
+          </a:p>
+          <a:p>
+            <a:r>
+              <a:rPr lang="en-US" dirty="0"/>
+              <a:t>What do you do in your free time </a:t>
+            </a:r>
+          </a:p>
+          <a:p>
+            <a:r>
+              <a:rPr lang="en-US" dirty="0"/>
+              <a:t>Favorite fruit</a:t>
             </a:r>
           </a:p>
           <a:p>
@@ -4586,7 +5050,7 @@
     </p:spTree>
     <p:extLst>
       <p:ext uri="{BB962C8B-B14F-4D97-AF65-F5344CB8AC3E}">
-        <p14:creationId xmlns:p14="http://schemas.microsoft.com/office/powerpoint/2010/main" val="1115756292"/>
+        <p14:creationId xmlns:p14="http://schemas.microsoft.com/office/powerpoint/2010/main" val="499878534"/>
       </p:ext>
     </p:extLst>
   </p:cSld>
@@ -4618,7 +5082,7 @@
           <p:cNvPr id="2" name="Title 1">
             <a:extLst>
               <a:ext uri="{FF2B5EF4-FFF2-40B4-BE49-F238E27FC236}">
-                <a16:creationId xmlns:a16="http://schemas.microsoft.com/office/drawing/2014/main" id="{8ACC9718-8B84-4DBA-AB23-D7555D1F77AE}"/>
+                <a16:creationId xmlns:a16="http://schemas.microsoft.com/office/drawing/2014/main" id="{FEE53610-4C91-4759-B0D9-E8B590BE3506}"/>
               </a:ext>
             </a:extLst>
           </p:cNvPr>
@@ -4635,42 +5099,65 @@
           <a:lstStyle/>
           <a:p>
             <a:r>
-              <a:rPr lang="en-US"/>
-              <a:t>Background</a:t>
-            </a:r>
+              <a:rPr lang="en-US" dirty="0"/>
+              <a:t>Mark</a:t>
+            </a:r>
+          </a:p>
+        </p:txBody>
+      </p:sp>
+      <p:sp>
+        <p:nvSpPr>
+          <p:cNvPr id="3" name="Content Placeholder 2">
+            <a:extLst>
+              <a:ext uri="{FF2B5EF4-FFF2-40B4-BE49-F238E27FC236}">
+                <a16:creationId xmlns:a16="http://schemas.microsoft.com/office/drawing/2014/main" id="{3BD577B9-839F-4F83-8848-2656FE4E4323}"/>
+              </a:ext>
+            </a:extLst>
+          </p:cNvPr>
+          <p:cNvSpPr>
+            <a:spLocks noGrp="1"/>
+          </p:cNvSpPr>
+          <p:nvPr>
+            <p:ph idx="1"/>
+          </p:nvPr>
+        </p:nvSpPr>
+        <p:spPr/>
+        <p:txBody>
+          <a:bodyPr/>
+          <a:lstStyle/>
+          <a:p>
+            <a:r>
+              <a:rPr lang="en-US" dirty="0"/>
+              <a:t>Previous education </a:t>
+            </a:r>
+          </a:p>
+          <a:p>
+            <a:r>
+              <a:rPr lang="en-US" dirty="0"/>
+              <a:t>Employment or were you were last employed or subject matter expertise</a:t>
+            </a:r>
+          </a:p>
+          <a:p>
+            <a:r>
+              <a:rPr lang="en-US" dirty="0"/>
+              <a:t>What do you do in your free time </a:t>
+            </a:r>
+          </a:p>
+          <a:p>
+            <a:r>
+              <a:rPr lang="en-US" dirty="0"/>
+              <a:t>Favorite fruit</a:t>
+            </a:r>
+          </a:p>
+          <a:p>
             <a:endParaRPr lang="en-US" dirty="0"/>
-          </a:p>
-        </p:txBody>
-      </p:sp>
-      <p:sp>
-        <p:nvSpPr>
-          <p:cNvPr id="3" name="Content Placeholder 2">
-            <a:extLst>
-              <a:ext uri="{FF2B5EF4-FFF2-40B4-BE49-F238E27FC236}">
-                <a16:creationId xmlns:a16="http://schemas.microsoft.com/office/drawing/2014/main" id="{39A47145-3EC6-42DB-BBD7-9FCEE02FF15F}"/>
-              </a:ext>
-            </a:extLst>
-          </p:cNvPr>
-          <p:cNvSpPr>
-            <a:spLocks noGrp="1"/>
-          </p:cNvSpPr>
-          <p:nvPr>
-            <p:ph idx="1"/>
-          </p:nvPr>
-        </p:nvSpPr>
-        <p:spPr/>
-        <p:txBody>
-          <a:bodyPr/>
-          <a:lstStyle/>
-          <a:p>
-            <a:endParaRPr lang="en-US"/>
           </a:p>
         </p:txBody>
       </p:sp>
     </p:spTree>
     <p:extLst>
       <p:ext uri="{BB962C8B-B14F-4D97-AF65-F5344CB8AC3E}">
-        <p14:creationId xmlns:p14="http://schemas.microsoft.com/office/powerpoint/2010/main" val="2342924608"/>
+        <p14:creationId xmlns:p14="http://schemas.microsoft.com/office/powerpoint/2010/main" val="2297697946"/>
       </p:ext>
     </p:extLst>
   </p:cSld>
@@ -4681,6 +5168,104 @@
 </file>
 
 <file path=ppt/slides/slide5.xml><?xml version="1.0" encoding="utf-8"?>
+<p:sld xmlns:a="http://schemas.openxmlformats.org/drawingml/2006/main" xmlns:r="http://schemas.openxmlformats.org/officeDocument/2006/relationships" xmlns:p="http://schemas.openxmlformats.org/presentationml/2006/main">
+  <p:cSld>
+    <p:spTree>
+      <p:nvGrpSpPr>
+        <p:cNvPr id="1" name=""/>
+        <p:cNvGrpSpPr/>
+        <p:nvPr/>
+      </p:nvGrpSpPr>
+      <p:grpSpPr>
+        <a:xfrm>
+          <a:off x="0" y="0"/>
+          <a:ext cx="0" cy="0"/>
+          <a:chOff x="0" y="0"/>
+          <a:chExt cx="0" cy="0"/>
+        </a:xfrm>
+      </p:grpSpPr>
+      <p:sp>
+        <p:nvSpPr>
+          <p:cNvPr id="2" name="Title 1">
+            <a:extLst>
+              <a:ext uri="{FF2B5EF4-FFF2-40B4-BE49-F238E27FC236}">
+                <a16:creationId xmlns:a16="http://schemas.microsoft.com/office/drawing/2014/main" id="{8BFC824E-D1EC-4F94-9986-567B20CFA1E4}"/>
+              </a:ext>
+            </a:extLst>
+          </p:cNvPr>
+          <p:cNvSpPr>
+            <a:spLocks noGrp="1"/>
+          </p:cNvSpPr>
+          <p:nvPr>
+            <p:ph type="title"/>
+          </p:nvPr>
+        </p:nvSpPr>
+        <p:spPr/>
+        <p:txBody>
+          <a:bodyPr/>
+          <a:lstStyle/>
+          <a:p>
+            <a:r>
+              <a:rPr lang="en-US" dirty="0"/>
+              <a:t>Project introduction ? Background</a:t>
+            </a:r>
+          </a:p>
+        </p:txBody>
+      </p:sp>
+      <p:sp>
+        <p:nvSpPr>
+          <p:cNvPr id="3" name="Content Placeholder 2">
+            <a:extLst>
+              <a:ext uri="{FF2B5EF4-FFF2-40B4-BE49-F238E27FC236}">
+                <a16:creationId xmlns:a16="http://schemas.microsoft.com/office/drawing/2014/main" id="{EBB3FD2F-9977-4D9A-B6B5-CE9E743E0E66}"/>
+              </a:ext>
+            </a:extLst>
+          </p:cNvPr>
+          <p:cNvSpPr>
+            <a:spLocks noGrp="1"/>
+          </p:cNvSpPr>
+          <p:nvPr>
+            <p:ph idx="1"/>
+          </p:nvPr>
+        </p:nvSpPr>
+        <p:spPr/>
+        <p:txBody>
+          <a:bodyPr/>
+          <a:lstStyle/>
+          <a:p>
+            <a:r>
+              <a:rPr lang="en-US" dirty="0"/>
+              <a:t>What is COVID-19</a:t>
+            </a:r>
+          </a:p>
+          <a:p>
+            <a:r>
+              <a:rPr lang="en-US" dirty="0"/>
+              <a:t>What are the impacts of COVID-19 to the world in General</a:t>
+            </a:r>
+          </a:p>
+          <a:p>
+            <a:r>
+              <a:rPr lang="en-US" dirty="0"/>
+              <a:t>Why we chose California </a:t>
+            </a:r>
+          </a:p>
+        </p:txBody>
+      </p:sp>
+    </p:spTree>
+    <p:extLst>
+      <p:ext uri="{BB962C8B-B14F-4D97-AF65-F5344CB8AC3E}">
+        <p14:creationId xmlns:p14="http://schemas.microsoft.com/office/powerpoint/2010/main" val="4029123039"/>
+      </p:ext>
+    </p:extLst>
+  </p:cSld>
+  <p:clrMapOvr>
+    <a:masterClrMapping/>
+  </p:clrMapOvr>
+</p:sld>
+</file>
+
+<file path=ppt/slides/slide6.xml><?xml version="1.0" encoding="utf-8"?>
 <p:sld xmlns:a="http://schemas.openxmlformats.org/drawingml/2006/main" xmlns:r="http://schemas.openxmlformats.org/officeDocument/2006/relationships" xmlns:p="http://schemas.openxmlformats.org/presentationml/2006/main">
   <p:cSld>
     <p:spTree>
@@ -4946,7 +5531,7 @@
 </p:sld>
 </file>
 
-<file path=ppt/slides/slide6.xml><?xml version="1.0" encoding="utf-8"?>
+<file path=ppt/slides/slide7.xml><?xml version="1.0" encoding="utf-8"?>
 <p:sld xmlns:a="http://schemas.openxmlformats.org/drawingml/2006/main" xmlns:r="http://schemas.openxmlformats.org/officeDocument/2006/relationships" xmlns:p="http://schemas.openxmlformats.org/presentationml/2006/main">
   <p:cSld>
     <p:spTree>
@@ -5187,7 +5772,7 @@
 </p:sld>
 </file>
 
-<file path=ppt/slides/slide7.xml><?xml version="1.0" encoding="utf-8"?>
+<file path=ppt/slides/slide8.xml><?xml version="1.0" encoding="utf-8"?>
 <p:sld xmlns:a="http://schemas.openxmlformats.org/drawingml/2006/main" xmlns:r="http://schemas.openxmlformats.org/officeDocument/2006/relationships" xmlns:p="http://schemas.openxmlformats.org/presentationml/2006/main">
   <p:cSld>
     <p:spTree>
@@ -5415,105 +6000,6 @@
 </p:sld>
 </file>
 
-<file path=ppt/slides/slide8.xml><?xml version="1.0" encoding="utf-8"?>
-<p:sld xmlns:a="http://schemas.openxmlformats.org/drawingml/2006/main" xmlns:r="http://schemas.openxmlformats.org/officeDocument/2006/relationships" xmlns:p="http://schemas.openxmlformats.org/presentationml/2006/main">
-  <p:cSld>
-    <p:spTree>
-      <p:nvGrpSpPr>
-        <p:cNvPr id="1" name=""/>
-        <p:cNvGrpSpPr/>
-        <p:nvPr/>
-      </p:nvGrpSpPr>
-      <p:grpSpPr>
-        <a:xfrm>
-          <a:off x="0" y="0"/>
-          <a:ext cx="0" cy="0"/>
-          <a:chOff x="0" y="0"/>
-          <a:chExt cx="0" cy="0"/>
-        </a:xfrm>
-      </p:grpSpPr>
-      <p:sp>
-        <p:nvSpPr>
-          <p:cNvPr id="2" name="Title 1">
-            <a:extLst>
-              <a:ext uri="{FF2B5EF4-FFF2-40B4-BE49-F238E27FC236}">
-                <a16:creationId xmlns:a16="http://schemas.microsoft.com/office/drawing/2014/main" id="{EBDBA0B3-9761-496D-BE50-CBBF4D707068}"/>
-              </a:ext>
-            </a:extLst>
-          </p:cNvPr>
-          <p:cNvSpPr>
-            <a:spLocks noGrp="1"/>
-          </p:cNvSpPr>
-          <p:nvPr>
-            <p:ph type="title"/>
-          </p:nvPr>
-        </p:nvSpPr>
-        <p:spPr>
-          <a:xfrm>
-            <a:off x="838200" y="-125763"/>
-            <a:ext cx="10515600" cy="1325563"/>
-          </a:xfrm>
-        </p:spPr>
-        <p:txBody>
-          <a:bodyPr/>
-          <a:lstStyle/>
-          <a:p>
-            <a:pPr algn="ctr"/>
-            <a:r>
-              <a:rPr lang="en-US" dirty="0"/>
-              <a:t>IMPACT OF COVID-19 </a:t>
-            </a:r>
-          </a:p>
-        </p:txBody>
-      </p:sp>
-      <p:pic>
-        <p:nvPicPr>
-          <p:cNvPr id="5" name="Content Placeholder 4" descr="A screen shot of a computer&#10;&#10;Description automatically generated">
-            <a:extLst>
-              <a:ext uri="{FF2B5EF4-FFF2-40B4-BE49-F238E27FC236}">
-                <a16:creationId xmlns:a16="http://schemas.microsoft.com/office/drawing/2014/main" id="{85C9F263-6881-40BC-8889-7777F391537E}"/>
-              </a:ext>
-            </a:extLst>
-          </p:cNvPr>
-          <p:cNvPicPr>
-            <a:picLocks noGrp="1" noChangeAspect="1"/>
-          </p:cNvPicPr>
-          <p:nvPr>
-            <p:ph idx="1"/>
-          </p:nvPr>
-        </p:nvPicPr>
-        <p:blipFill>
-          <a:blip r:embed="rId3">
-            <a:extLst>
-              <a:ext uri="{28A0092B-C50C-407E-A947-70E740481C1C}">
-                <a14:useLocalDpi xmlns:a14="http://schemas.microsoft.com/office/drawing/2010/main" val="0"/>
-              </a:ext>
-            </a:extLst>
-          </a:blip>
-          <a:stretch>
-            <a:fillRect/>
-          </a:stretch>
-        </p:blipFill>
-        <p:spPr>
-          <a:xfrm>
-            <a:off x="0" y="1069315"/>
-            <a:ext cx="12192000" cy="4901275"/>
-          </a:xfrm>
-        </p:spPr>
-      </p:pic>
-    </p:spTree>
-    <p:extLst>
-      <p:ext uri="{BB962C8B-B14F-4D97-AF65-F5344CB8AC3E}">
-        <p14:creationId xmlns:p14="http://schemas.microsoft.com/office/powerpoint/2010/main" val="1226178468"/>
-      </p:ext>
-    </p:extLst>
-  </p:cSld>
-  <p:clrMapOvr>
-    <a:masterClrMapping/>
-  </p:clrMapOvr>
-</p:sld>
-</file>
-
 <file path=ppt/slides/slide9.xml><?xml version="1.0" encoding="utf-8"?>
 <p:sld xmlns:a="http://schemas.openxmlformats.org/drawingml/2006/main" xmlns:r="http://schemas.openxmlformats.org/officeDocument/2006/relationships" xmlns:p="http://schemas.openxmlformats.org/presentationml/2006/main">
   <p:cSld>
@@ -5536,7 +6022,7 @@
           <p:cNvPr id="2" name="Title 1">
             <a:extLst>
               <a:ext uri="{FF2B5EF4-FFF2-40B4-BE49-F238E27FC236}">
-                <a16:creationId xmlns:a16="http://schemas.microsoft.com/office/drawing/2014/main" id="{AE3B0C92-8C33-47A9-94A2-801A38F6B3E0}"/>
+                <a16:creationId xmlns:a16="http://schemas.microsoft.com/office/drawing/2014/main" id="{EBDBA0B3-9761-496D-BE50-CBBF4D707068}"/>
               </a:ext>
             </a:extLst>
           </p:cNvPr>
@@ -5549,71 +6035,61 @@
         </p:nvSpPr>
         <p:spPr>
           <a:xfrm>
-            <a:off x="838200" y="365125"/>
-            <a:ext cx="10515600" cy="1711325"/>
+            <a:off x="838200" y="-125763"/>
+            <a:ext cx="10515600" cy="1325563"/>
           </a:xfrm>
         </p:spPr>
         <p:txBody>
           <a:bodyPr/>
           <a:lstStyle/>
           <a:p>
+            <a:pPr algn="ctr"/>
             <a:r>
               <a:rPr lang="en-US" dirty="0"/>
-              <a:t>QN: Are the homeless cases equal to the general public cases.</a:t>
-            </a:r>
-          </a:p>
-        </p:txBody>
-      </p:sp>
-      <p:sp>
-        <p:nvSpPr>
-          <p:cNvPr id="3" name="Content Placeholder 2">
-            <a:extLst>
-              <a:ext uri="{FF2B5EF4-FFF2-40B4-BE49-F238E27FC236}">
-                <a16:creationId xmlns:a16="http://schemas.microsoft.com/office/drawing/2014/main" id="{9875D5FB-597C-43A6-B437-0B3C198EC566}"/>
-              </a:ext>
-            </a:extLst>
-          </p:cNvPr>
-          <p:cNvSpPr>
-            <a:spLocks noGrp="1"/>
-          </p:cNvSpPr>
+              <a:t>IMPACT OF COVID-19 </a:t>
+            </a:r>
+          </a:p>
+        </p:txBody>
+      </p:sp>
+      <p:pic>
+        <p:nvPicPr>
+          <p:cNvPr id="5" name="Content Placeholder 4" descr="A screen shot of a computer&#10;&#10;Description automatically generated">
+            <a:extLst>
+              <a:ext uri="{FF2B5EF4-FFF2-40B4-BE49-F238E27FC236}">
+                <a16:creationId xmlns:a16="http://schemas.microsoft.com/office/drawing/2014/main" id="{85C9F263-6881-40BC-8889-7777F391537E}"/>
+              </a:ext>
+            </a:extLst>
+          </p:cNvPr>
+          <p:cNvPicPr>
+            <a:picLocks noGrp="1" noChangeAspect="1"/>
+          </p:cNvPicPr>
           <p:nvPr>
             <p:ph idx="1"/>
           </p:nvPr>
-        </p:nvSpPr>
+        </p:nvPicPr>
+        <p:blipFill>
+          <a:blip r:embed="rId3">
+            <a:extLst>
+              <a:ext uri="{28A0092B-C50C-407E-A947-70E740481C1C}">
+                <a14:useLocalDpi xmlns:a14="http://schemas.microsoft.com/office/drawing/2010/main" val="0"/>
+              </a:ext>
+            </a:extLst>
+          </a:blip>
+          <a:stretch>
+            <a:fillRect/>
+          </a:stretch>
+        </p:blipFill>
         <p:spPr>
           <a:xfrm>
-            <a:off x="838200" y="2400299"/>
-            <a:ext cx="10515600" cy="3776663"/>
+            <a:off x="0" y="1069315"/>
+            <a:ext cx="12192000" cy="4901275"/>
           </a:xfrm>
         </p:spPr>
-        <p:txBody>
-          <a:bodyPr/>
-          <a:lstStyle/>
-          <a:p>
-            <a:r>
-              <a:rPr lang="en-US" dirty="0"/>
-              <a:t>We ran a one proportional z-test </a:t>
-            </a:r>
-          </a:p>
-          <a:p>
-            <a:pPr lvl="1"/>
-            <a:r>
-              <a:rPr lang="en-US" dirty="0"/>
-              <a:t>A one proportion z-test is used to compare an observed proportion to a theoretical one, when there are only 2 categories</a:t>
-            </a:r>
-          </a:p>
-          <a:p>
-            <a:r>
-              <a:rPr lang="en-US" dirty="0"/>
-              <a:t>We discovered that , the homeless cases are not equal to the general public cases. In fact that the homeless cases are only 3.8% of the positive COVID19 cases observed in San Francisco. </a:t>
-            </a:r>
-          </a:p>
-        </p:txBody>
-      </p:sp>
+      </p:pic>
     </p:spTree>
     <p:extLst>
       <p:ext uri="{BB962C8B-B14F-4D97-AF65-F5344CB8AC3E}">
-        <p14:creationId xmlns:p14="http://schemas.microsoft.com/office/powerpoint/2010/main" val="2766681524"/>
+        <p14:creationId xmlns:p14="http://schemas.microsoft.com/office/powerpoint/2010/main" val="1226178468"/>
       </p:ext>
     </p:extLst>
   </p:cSld>

</xml_diff>

<commit_message>
updated ppt with my questions.
</commit_message>
<xml_diff>
--- a/RecoverdDFTppt.pptx
+++ b/RecoverdDFTppt.pptx
@@ -5,7 +5,7 @@
     <p:sldMasterId id="2147483648" r:id="rId1"/>
   </p:sldMasterIdLst>
   <p:notesMasterIdLst>
-    <p:notesMasterId r:id="rId14"/>
+    <p:notesMasterId r:id="rId16"/>
   </p:notesMasterIdLst>
   <p:sldIdLst>
     <p:sldId id="256" r:id="rId2"/>
@@ -18,8 +18,10 @@
     <p:sldId id="262" r:id="rId9"/>
     <p:sldId id="265" r:id="rId10"/>
     <p:sldId id="267" r:id="rId11"/>
-    <p:sldId id="266" r:id="rId12"/>
-    <p:sldId id="260" r:id="rId13"/>
+    <p:sldId id="268" r:id="rId12"/>
+    <p:sldId id="269" r:id="rId13"/>
+    <p:sldId id="266" r:id="rId14"/>
+    <p:sldId id="260" r:id="rId15"/>
   </p:sldIdLst>
   <p:sldSz cx="12192000" cy="6858000"/>
   <p:notesSz cx="6858000" cy="9144000"/>
@@ -4122,12 +4124,294 @@
             <p:ph type="title"/>
           </p:nvPr>
         </p:nvSpPr>
+        <p:spPr>
+          <a:xfrm>
+            <a:off x="838200" y="365125"/>
+            <a:ext cx="10515600" cy="2035174"/>
+          </a:xfrm>
+        </p:spPr>
+        <p:txBody>
+          <a:bodyPr>
+            <a:normAutofit/>
+          </a:bodyPr>
+          <a:lstStyle/>
+          <a:p>
+            <a:r>
+              <a:rPr lang="en-US" dirty="0"/>
+              <a:t>QN: </a:t>
+            </a:r>
+            <a:r>
+              <a:rPr lang="en-US" b="1" i="0" dirty="0">
+                <a:solidFill>
+                  <a:srgbClr val="000000"/>
+                </a:solidFill>
+                <a:effectLst/>
+                <a:latin typeface="Helvetica Neue"/>
+              </a:rPr>
+              <a:t> </a:t>
+            </a:r>
+            <a:r>
+              <a:rPr lang="en-US" i="0" dirty="0">
+                <a:solidFill>
+                  <a:srgbClr val="000000"/>
+                </a:solidFill>
+                <a:effectLst/>
+              </a:rPr>
+              <a:t>Have the rooms availability in the homeless shelters been affected by the </a:t>
+            </a:r>
+            <a:r>
+              <a:rPr lang="en-US" i="0" dirty="0" err="1">
+                <a:solidFill>
+                  <a:srgbClr val="000000"/>
+                </a:solidFill>
+                <a:effectLst/>
+              </a:rPr>
+              <a:t>covid</a:t>
+            </a:r>
+            <a:r>
+              <a:rPr lang="en-US" i="0" dirty="0">
+                <a:solidFill>
+                  <a:srgbClr val="000000"/>
+                </a:solidFill>
+                <a:effectLst/>
+              </a:rPr>
+              <a:t> cases in the county of San Francisco?</a:t>
+            </a:r>
+            <a:endParaRPr lang="en-US" dirty="0"/>
+          </a:p>
+        </p:txBody>
+      </p:sp>
+      <p:sp>
+        <p:nvSpPr>
+          <p:cNvPr id="3" name="Content Placeholder 2">
+            <a:extLst>
+              <a:ext uri="{FF2B5EF4-FFF2-40B4-BE49-F238E27FC236}">
+                <a16:creationId xmlns:a16="http://schemas.microsoft.com/office/drawing/2014/main" id="{9875D5FB-597C-43A6-B437-0B3C198EC566}"/>
+              </a:ext>
+            </a:extLst>
+          </p:cNvPr>
+          <p:cNvSpPr>
+            <a:spLocks noGrp="1"/>
+          </p:cNvSpPr>
+          <p:nvPr>
+            <p:ph idx="1"/>
+          </p:nvPr>
+        </p:nvSpPr>
+        <p:spPr>
+          <a:xfrm>
+            <a:off x="838200" y="2400299"/>
+            <a:ext cx="10515600" cy="3776663"/>
+          </a:xfrm>
+        </p:spPr>
+        <p:txBody>
+          <a:bodyPr/>
+          <a:lstStyle/>
+          <a:p>
+            <a:r>
+              <a:rPr lang="en-US" dirty="0"/>
+              <a:t>We ran the Independent Chi-Square analysis.</a:t>
+            </a:r>
+          </a:p>
+          <a:p>
+            <a:pPr lvl="1"/>
+            <a:r>
+              <a:rPr lang="en-US" dirty="0"/>
+              <a:t>Independent Chi-Square will be used to explain the relationship between the Shelter’s rooms availability and the homeless cases.</a:t>
+            </a:r>
+          </a:p>
+          <a:p>
+            <a:r>
+              <a:rPr lang="en-US" dirty="0"/>
+              <a:t>We discovered that as the homeless cases increased the rooms availability decreased especially, in the later months of June and July.</a:t>
+            </a:r>
+          </a:p>
+        </p:txBody>
+      </p:sp>
+    </p:spTree>
+    <p:extLst>
+      <p:ext uri="{BB962C8B-B14F-4D97-AF65-F5344CB8AC3E}">
+        <p14:creationId xmlns:p14="http://schemas.microsoft.com/office/powerpoint/2010/main" val="3194323315"/>
+      </p:ext>
+    </p:extLst>
+  </p:cSld>
+  <p:clrMapOvr>
+    <a:masterClrMapping/>
+  </p:clrMapOvr>
+</p:sld>
+</file>
+
+<file path=ppt/slides/slide12.xml><?xml version="1.0" encoding="utf-8"?>
+<p:sld xmlns:a="http://schemas.openxmlformats.org/drawingml/2006/main" xmlns:r="http://schemas.openxmlformats.org/officeDocument/2006/relationships" xmlns:p="http://schemas.openxmlformats.org/presentationml/2006/main">
+  <p:cSld>
+    <p:spTree>
+      <p:nvGrpSpPr>
+        <p:cNvPr id="1" name=""/>
+        <p:cNvGrpSpPr/>
+        <p:nvPr/>
+      </p:nvGrpSpPr>
+      <p:grpSpPr>
+        <a:xfrm>
+          <a:off x="0" y="0"/>
+          <a:ext cx="0" cy="0"/>
+          <a:chOff x="0" y="0"/>
+          <a:chExt cx="0" cy="0"/>
+        </a:xfrm>
+      </p:grpSpPr>
+      <p:sp>
+        <p:nvSpPr>
+          <p:cNvPr id="2" name="Title 1">
+            <a:extLst>
+              <a:ext uri="{FF2B5EF4-FFF2-40B4-BE49-F238E27FC236}">
+                <a16:creationId xmlns:a16="http://schemas.microsoft.com/office/drawing/2014/main" id="{AE3B0C92-8C33-47A9-94A2-801A38F6B3E0}"/>
+              </a:ext>
+            </a:extLst>
+          </p:cNvPr>
+          <p:cNvSpPr>
+            <a:spLocks noGrp="1"/>
+          </p:cNvSpPr>
+          <p:nvPr>
+            <p:ph type="title"/>
+          </p:nvPr>
+        </p:nvSpPr>
+        <p:spPr>
+          <a:xfrm>
+            <a:off x="838200" y="365125"/>
+            <a:ext cx="10515600" cy="2035174"/>
+          </a:xfrm>
+        </p:spPr>
+        <p:txBody>
+          <a:bodyPr>
+            <a:normAutofit/>
+          </a:bodyPr>
+          <a:lstStyle/>
+          <a:p>
+            <a:r>
+              <a:rPr lang="en-US" dirty="0"/>
+              <a:t>QN: </a:t>
+            </a:r>
+            <a:r>
+              <a:rPr lang="en-US" b="1" i="0" dirty="0">
+                <a:solidFill>
+                  <a:srgbClr val="000000"/>
+                </a:solidFill>
+                <a:effectLst/>
+                <a:latin typeface="Helvetica Neue"/>
+              </a:rPr>
+              <a:t> </a:t>
+            </a:r>
+            <a:r>
+              <a:rPr lang="en-US" i="0" dirty="0">
+                <a:solidFill>
+                  <a:srgbClr val="000000"/>
+                </a:solidFill>
+                <a:effectLst/>
+              </a:rPr>
+              <a:t>Online source has stated that the homeless population was hit 80% harder compared to the public.?</a:t>
+            </a:r>
+            <a:endParaRPr lang="en-US" dirty="0"/>
+          </a:p>
+        </p:txBody>
+      </p:sp>
+      <p:sp>
+        <p:nvSpPr>
+          <p:cNvPr id="3" name="Content Placeholder 2">
+            <a:extLst>
+              <a:ext uri="{FF2B5EF4-FFF2-40B4-BE49-F238E27FC236}">
+                <a16:creationId xmlns:a16="http://schemas.microsoft.com/office/drawing/2014/main" id="{9875D5FB-597C-43A6-B437-0B3C198EC566}"/>
+              </a:ext>
+            </a:extLst>
+          </p:cNvPr>
+          <p:cNvSpPr>
+            <a:spLocks noGrp="1"/>
+          </p:cNvSpPr>
+          <p:nvPr>
+            <p:ph idx="1"/>
+          </p:nvPr>
+        </p:nvSpPr>
+        <p:spPr>
+          <a:xfrm>
+            <a:off x="838200" y="2400299"/>
+            <a:ext cx="10515600" cy="3776663"/>
+          </a:xfrm>
+        </p:spPr>
+        <p:txBody>
+          <a:bodyPr>
+            <a:normAutofit lnSpcReduction="10000"/>
+          </a:bodyPr>
+          <a:lstStyle/>
+          <a:p>
+            <a:r>
+              <a:rPr lang="en-US" dirty="0"/>
+              <a:t>We ran the Goodness of Fit Chi-Squares analysis.</a:t>
+            </a:r>
+          </a:p>
+          <a:p>
+            <a:pPr lvl="1"/>
+            <a:r>
+              <a:rPr lang="en-US" dirty="0"/>
+              <a:t>Goodness of Fit Chi-Squares Analysis will be used to explain the relationship between the observed and expected values from that online source..</a:t>
+            </a:r>
+          </a:p>
+          <a:p>
+            <a:r>
+              <a:rPr lang="en-US" dirty="0"/>
+              <a:t>We discovered first that this stats is not even close to be true, then we ran the two proportion z test analysis and found that the impact in each population as follows; the homeless was impacted by 2.5% in their population. The general public was impacted by 0.71% in their population. Comparing the percentage to each other. We can conclude that the homeless was impacted 111.8% harder than the general public. </a:t>
+            </a:r>
+          </a:p>
+        </p:txBody>
+      </p:sp>
+    </p:spTree>
+    <p:extLst>
+      <p:ext uri="{BB962C8B-B14F-4D97-AF65-F5344CB8AC3E}">
+        <p14:creationId xmlns:p14="http://schemas.microsoft.com/office/powerpoint/2010/main" val="73080989"/>
+      </p:ext>
+    </p:extLst>
+  </p:cSld>
+  <p:clrMapOvr>
+    <a:masterClrMapping/>
+  </p:clrMapOvr>
+</p:sld>
+</file>
+
+<file path=ppt/slides/slide13.xml><?xml version="1.0" encoding="utf-8"?>
+<p:sld xmlns:a="http://schemas.openxmlformats.org/drawingml/2006/main" xmlns:r="http://schemas.openxmlformats.org/officeDocument/2006/relationships" xmlns:p="http://schemas.openxmlformats.org/presentationml/2006/main">
+  <p:cSld>
+    <p:spTree>
+      <p:nvGrpSpPr>
+        <p:cNvPr id="1" name=""/>
+        <p:cNvGrpSpPr/>
+        <p:nvPr/>
+      </p:nvGrpSpPr>
+      <p:grpSpPr>
+        <a:xfrm>
+          <a:off x="0" y="0"/>
+          <a:ext cx="0" cy="0"/>
+          <a:chOff x="0" y="0"/>
+          <a:chExt cx="0" cy="0"/>
+        </a:xfrm>
+      </p:grpSpPr>
+      <p:sp>
+        <p:nvSpPr>
+          <p:cNvPr id="2" name="Title 1">
+            <a:extLst>
+              <a:ext uri="{FF2B5EF4-FFF2-40B4-BE49-F238E27FC236}">
+                <a16:creationId xmlns:a16="http://schemas.microsoft.com/office/drawing/2014/main" id="{AE3B0C92-8C33-47A9-94A2-801A38F6B3E0}"/>
+              </a:ext>
+            </a:extLst>
+          </p:cNvPr>
+          <p:cNvSpPr>
+            <a:spLocks noGrp="1"/>
+          </p:cNvSpPr>
+          <p:nvPr>
+            <p:ph type="title"/>
+          </p:nvPr>
+        </p:nvSpPr>
         <p:spPr/>
         <p:txBody>
           <a:bodyPr/>
           <a:lstStyle/>
           <a:p>
-            <a:endParaRPr lang="en-US"/>
+            <a:endParaRPr lang="en-US" dirty="0"/>
           </a:p>
         </p:txBody>
       </p:sp>
@@ -4169,7 +4453,7 @@
 </p:sld>
 </file>
 
-<file path=ppt/slides/slide12.xml><?xml version="1.0" encoding="utf-8"?>
+<file path=ppt/slides/slide14.xml><?xml version="1.0" encoding="utf-8"?>
 <p:sld xmlns:a="http://schemas.openxmlformats.org/drawingml/2006/main" xmlns:r="http://schemas.openxmlformats.org/officeDocument/2006/relationships" xmlns:p="http://schemas.openxmlformats.org/presentationml/2006/main">
   <p:cSld>
     <p:spTree>

</xml_diff>